<commit_message>
Coursework Part 1 Design
</commit_message>
<xml_diff>
--- a/MovieQ Design.pptx
+++ b/MovieQ Design.pptx
@@ -6,6 +6,7 @@
   </p:sldMasterIdLst>
   <p:sldIdLst>
     <p:sldId id="256" r:id="rId2"/>
+    <p:sldId id="257" r:id="rId3"/>
   </p:sldIdLst>
   <p:sldSz cx="12192000" cy="6858000"/>
   <p:notesSz cx="6858000" cy="9144000"/>
@@ -104,6 +105,11 @@
       </a:defRPr>
     </a:lvl9pPr>
   </p:defaultTextStyle>
+  <p:extLst>
+    <p:ext uri="{EFAFB233-063F-42B5-8137-9DF3F51BA10A}">
+      <p15:sldGuideLst xmlns:p15="http://schemas.microsoft.com/office/powerpoint/2012/main"/>
+    </p:ext>
+  </p:extLst>
 </p:presentation>
 </file>
 
@@ -256,7 +262,7 @@
           <a:p>
             <a:fld id="{7C86358E-79CC-484F-934D-4E3A2D61E8DF}" type="datetimeFigureOut">
               <a:rPr lang="en-GB" smtClean="0"/>
-              <a:t>13/02/2022</a:t>
+              <a:t>21/02/2022</a:t>
             </a:fld>
             <a:endParaRPr lang="en-GB"/>
           </a:p>
@@ -456,7 +462,7 @@
           <a:p>
             <a:fld id="{7C86358E-79CC-484F-934D-4E3A2D61E8DF}" type="datetimeFigureOut">
               <a:rPr lang="en-GB" smtClean="0"/>
-              <a:t>13/02/2022</a:t>
+              <a:t>21/02/2022</a:t>
             </a:fld>
             <a:endParaRPr lang="en-GB"/>
           </a:p>
@@ -666,7 +672,7 @@
           <a:p>
             <a:fld id="{7C86358E-79CC-484F-934D-4E3A2D61E8DF}" type="datetimeFigureOut">
               <a:rPr lang="en-GB" smtClean="0"/>
-              <a:t>13/02/2022</a:t>
+              <a:t>21/02/2022</a:t>
             </a:fld>
             <a:endParaRPr lang="en-GB"/>
           </a:p>
@@ -866,7 +872,7 @@
           <a:p>
             <a:fld id="{7C86358E-79CC-484F-934D-4E3A2D61E8DF}" type="datetimeFigureOut">
               <a:rPr lang="en-GB" smtClean="0"/>
-              <a:t>13/02/2022</a:t>
+              <a:t>21/02/2022</a:t>
             </a:fld>
             <a:endParaRPr lang="en-GB"/>
           </a:p>
@@ -1142,7 +1148,7 @@
           <a:p>
             <a:fld id="{7C86358E-79CC-484F-934D-4E3A2D61E8DF}" type="datetimeFigureOut">
               <a:rPr lang="en-GB" smtClean="0"/>
-              <a:t>13/02/2022</a:t>
+              <a:t>21/02/2022</a:t>
             </a:fld>
             <a:endParaRPr lang="en-GB"/>
           </a:p>
@@ -1410,7 +1416,7 @@
           <a:p>
             <a:fld id="{7C86358E-79CC-484F-934D-4E3A2D61E8DF}" type="datetimeFigureOut">
               <a:rPr lang="en-GB" smtClean="0"/>
-              <a:t>13/02/2022</a:t>
+              <a:t>21/02/2022</a:t>
             </a:fld>
             <a:endParaRPr lang="en-GB"/>
           </a:p>
@@ -1825,7 +1831,7 @@
           <a:p>
             <a:fld id="{7C86358E-79CC-484F-934D-4E3A2D61E8DF}" type="datetimeFigureOut">
               <a:rPr lang="en-GB" smtClean="0"/>
-              <a:t>13/02/2022</a:t>
+              <a:t>21/02/2022</a:t>
             </a:fld>
             <a:endParaRPr lang="en-GB"/>
           </a:p>
@@ -1967,7 +1973,7 @@
           <a:p>
             <a:fld id="{7C86358E-79CC-484F-934D-4E3A2D61E8DF}" type="datetimeFigureOut">
               <a:rPr lang="en-GB" smtClean="0"/>
-              <a:t>13/02/2022</a:t>
+              <a:t>21/02/2022</a:t>
             </a:fld>
             <a:endParaRPr lang="en-GB"/>
           </a:p>
@@ -2080,7 +2086,7 @@
           <a:p>
             <a:fld id="{7C86358E-79CC-484F-934D-4E3A2D61E8DF}" type="datetimeFigureOut">
               <a:rPr lang="en-GB" smtClean="0"/>
-              <a:t>13/02/2022</a:t>
+              <a:t>21/02/2022</a:t>
             </a:fld>
             <a:endParaRPr lang="en-GB"/>
           </a:p>
@@ -2393,7 +2399,7 @@
           <a:p>
             <a:fld id="{7C86358E-79CC-484F-934D-4E3A2D61E8DF}" type="datetimeFigureOut">
               <a:rPr lang="en-GB" smtClean="0"/>
-              <a:t>13/02/2022</a:t>
+              <a:t>21/02/2022</a:t>
             </a:fld>
             <a:endParaRPr lang="en-GB"/>
           </a:p>
@@ -2682,7 +2688,7 @@
           <a:p>
             <a:fld id="{7C86358E-79CC-484F-934D-4E3A2D61E8DF}" type="datetimeFigureOut">
               <a:rPr lang="en-GB" smtClean="0"/>
-              <a:t>13/02/2022</a:t>
+              <a:t>21/02/2022</a:t>
             </a:fld>
             <a:endParaRPr lang="en-GB"/>
           </a:p>
@@ -2925,7 +2931,7 @@
           <a:p>
             <a:fld id="{7C86358E-79CC-484F-934D-4E3A2D61E8DF}" type="datetimeFigureOut">
               <a:rPr lang="en-GB" smtClean="0"/>
-              <a:t>13/02/2022</a:t>
+              <a:t>21/02/2022</a:t>
             </a:fld>
             <a:endParaRPr lang="en-GB"/>
           </a:p>
@@ -3328,6 +3334,16 @@
 <file path=ppt/slides/slide1.xml><?xml version="1.0" encoding="utf-8"?>
 <p:sld xmlns:a="http://schemas.openxmlformats.org/drawingml/2006/main" xmlns:r="http://schemas.openxmlformats.org/officeDocument/2006/relationships" xmlns:p="http://schemas.openxmlformats.org/presentationml/2006/main">
   <p:cSld>
+    <p:bg>
+      <p:bgPr>
+        <a:solidFill>
+          <a:schemeClr val="bg1">
+            <a:lumMod val="95000"/>
+          </a:schemeClr>
+        </a:solidFill>
+        <a:effectLst/>
+      </p:bgPr>
+    </p:bg>
     <p:spTree>
       <p:nvGrpSpPr>
         <p:cNvPr id="1" name=""/>
@@ -3391,67 +3407,6 @@
           </a:p>
         </p:txBody>
       </p:sp>
-      <p:sp>
-        <p:nvSpPr>
-          <p:cNvPr id="3" name="Podnadpis 2">
-            <a:extLst>
-              <a:ext uri="{FF2B5EF4-FFF2-40B4-BE49-F238E27FC236}">
-                <a16:creationId xmlns:a16="http://schemas.microsoft.com/office/drawing/2014/main" id="{226A03A4-41D5-4F16-B8C2-87E28B87873D}"/>
-              </a:ext>
-            </a:extLst>
-          </p:cNvPr>
-          <p:cNvSpPr>
-            <a:spLocks noGrp="1"/>
-          </p:cNvSpPr>
-          <p:nvPr>
-            <p:ph type="subTitle" idx="1"/>
-          </p:nvPr>
-        </p:nvSpPr>
-        <p:spPr/>
-        <p:txBody>
-          <a:bodyPr/>
-          <a:lstStyle/>
-          <a:p>
-            <a:endParaRPr lang="en-GB" dirty="0"/>
-          </a:p>
-        </p:txBody>
-      </p:sp>
-      <p:pic>
-        <p:nvPicPr>
-          <p:cNvPr id="5" name="Obrázok 4" descr="Obrázok, na ktorom je text&#10;&#10;Automaticky generovaný popis">
-            <a:extLst>
-              <a:ext uri="{FF2B5EF4-FFF2-40B4-BE49-F238E27FC236}">
-                <a16:creationId xmlns:a16="http://schemas.microsoft.com/office/drawing/2014/main" id="{E1941789-8FDE-46EA-84A6-85F8D609B9A5}"/>
-              </a:ext>
-            </a:extLst>
-          </p:cNvPr>
-          <p:cNvPicPr>
-            <a:picLocks noChangeAspect="1"/>
-          </p:cNvPicPr>
-          <p:nvPr/>
-        </p:nvPicPr>
-        <p:blipFill>
-          <a:blip r:embed="rId2">
-            <a:extLst>
-              <a:ext uri="{28A0092B-C50C-407E-A947-70E740481C1C}">
-                <a14:useLocalDpi xmlns:a14="http://schemas.microsoft.com/office/drawing/2010/main" val="0"/>
-              </a:ext>
-            </a:extLst>
-          </a:blip>
-          <a:stretch>
-            <a:fillRect/>
-          </a:stretch>
-        </p:blipFill>
-        <p:spPr>
-          <a:xfrm>
-            <a:off x="3062363" y="4243047"/>
-            <a:ext cx="5665491" cy="2985180"/>
-          </a:xfrm>
-          <a:prstGeom prst="rect">
-            <a:avLst/>
-          </a:prstGeom>
-        </p:spPr>
-      </p:pic>
       <p:pic>
         <p:nvPicPr>
           <p:cNvPr id="1026" name="Picture 2" descr="Menu Icon White Transparent – Free PNG Images Vector, PSD, Clipart,  Templates">
@@ -3467,7 +3422,7 @@
           <p:nvPr/>
         </p:nvPicPr>
         <p:blipFill>
-          <a:blip r:embed="rId3">
+          <a:blip r:embed="rId2">
             <a:extLst>
               <a:ext uri="{28A0092B-C50C-407E-A947-70E740481C1C}">
                 <a14:useLocalDpi xmlns:a14="http://schemas.microsoft.com/office/drawing/2010/main" val="0"/>
@@ -3514,7 +3469,7 @@
           <p:nvPr/>
         </p:nvPicPr>
         <p:blipFill>
-          <a:blip r:embed="rId4">
+          <a:blip r:embed="rId3">
             <a:extLst>
               <a:ext uri="{28A0092B-C50C-407E-A947-70E740481C1C}">
                 <a14:useLocalDpi xmlns:a14="http://schemas.microsoft.com/office/drawing/2010/main" val="0"/>
@@ -3561,7 +3516,7 @@
           <p:nvPr/>
         </p:nvPicPr>
         <p:blipFill>
-          <a:blip r:embed="rId5">
+          <a:blip r:embed="rId4">
             <a:extLst>
               <a:ext uri="{28A0092B-C50C-407E-A947-70E740481C1C}">
                 <a14:useLocalDpi xmlns:a14="http://schemas.microsoft.com/office/drawing/2010/main" val="0"/>
@@ -3593,10 +3548,987 @@
           </a:extLst>
         </p:spPr>
       </p:pic>
+      <p:sp>
+        <p:nvSpPr>
+          <p:cNvPr id="4" name="BlokTextu 3">
+            <a:extLst>
+              <a:ext uri="{FF2B5EF4-FFF2-40B4-BE49-F238E27FC236}">
+                <a16:creationId xmlns:a16="http://schemas.microsoft.com/office/drawing/2014/main" id="{2B20C0EF-949E-437F-A2F2-780552DE347C}"/>
+              </a:ext>
+            </a:extLst>
+          </p:cNvPr>
+          <p:cNvSpPr txBox="1"/>
+          <p:nvPr/>
+        </p:nvSpPr>
+        <p:spPr>
+          <a:xfrm>
+            <a:off x="10171523" y="928952"/>
+            <a:ext cx="2020478" cy="5632311"/>
+          </a:xfrm>
+          <a:prstGeom prst="rect">
+            <a:avLst/>
+          </a:prstGeom>
+          <a:solidFill>
+            <a:srgbClr val="CBEAE8"/>
+          </a:solidFill>
+          <a:ln>
+            <a:solidFill>
+              <a:srgbClr val="CBEAE8"/>
+            </a:solidFill>
+          </a:ln>
+        </p:spPr>
+        <p:txBody>
+          <a:bodyPr wrap="square" rtlCol="0">
+            <a:spAutoFit/>
+          </a:bodyPr>
+          <a:lstStyle/>
+          <a:p>
+            <a:pPr algn="ctr"/>
+            <a:endParaRPr lang="en-US" dirty="0">
+              <a:latin typeface="Abadi" panose="020B0604020104020204" pitchFamily="34" charset="0"/>
+            </a:endParaRPr>
+          </a:p>
+          <a:p>
+            <a:pPr algn="ctr"/>
+            <a:r>
+              <a:rPr lang="en-US" dirty="0">
+                <a:latin typeface="Abadi" panose="020B0604020104020204" pitchFamily="34" charset="0"/>
+              </a:rPr>
+              <a:t>• Question 1</a:t>
+            </a:r>
+          </a:p>
+          <a:p>
+            <a:pPr algn="ctr"/>
+            <a:endParaRPr lang="en-US" dirty="0">
+              <a:latin typeface="Abadi" panose="020B0604020104020204" pitchFamily="34" charset="0"/>
+            </a:endParaRPr>
+          </a:p>
+          <a:p>
+            <a:pPr algn="ctr"/>
+            <a:r>
+              <a:rPr lang="en-US" dirty="0">
+                <a:latin typeface="Abadi" panose="020B0604020104020204" pitchFamily="34" charset="0"/>
+              </a:rPr>
+              <a:t>• Question 2</a:t>
+            </a:r>
+          </a:p>
+          <a:p>
+            <a:pPr algn="ctr"/>
+            <a:endParaRPr lang="en-US" dirty="0">
+              <a:latin typeface="Abadi" panose="020B0604020104020204" pitchFamily="34" charset="0"/>
+            </a:endParaRPr>
+          </a:p>
+          <a:p>
+            <a:pPr algn="ctr"/>
+            <a:r>
+              <a:rPr lang="en-US" dirty="0">
+                <a:latin typeface="Abadi" panose="020B0604020104020204" pitchFamily="34" charset="0"/>
+              </a:rPr>
+              <a:t>• Question 3</a:t>
+            </a:r>
+          </a:p>
+          <a:p>
+            <a:pPr algn="ctr"/>
+            <a:endParaRPr lang="en-US" dirty="0">
+              <a:latin typeface="Abadi" panose="020B0604020104020204" pitchFamily="34" charset="0"/>
+            </a:endParaRPr>
+          </a:p>
+          <a:p>
+            <a:pPr algn="ctr"/>
+            <a:r>
+              <a:rPr lang="en-US" dirty="0">
+                <a:latin typeface="Abadi" panose="020B0604020104020204" pitchFamily="34" charset="0"/>
+              </a:rPr>
+              <a:t>• Question 4</a:t>
+            </a:r>
+          </a:p>
+          <a:p>
+            <a:pPr algn="ctr"/>
+            <a:endParaRPr lang="en-US" dirty="0">
+              <a:latin typeface="Abadi" panose="020B0604020104020204" pitchFamily="34" charset="0"/>
+            </a:endParaRPr>
+          </a:p>
+          <a:p>
+            <a:pPr algn="ctr"/>
+            <a:r>
+              <a:rPr lang="en-US" dirty="0">
+                <a:latin typeface="Abadi" panose="020B0604020104020204" pitchFamily="34" charset="0"/>
+              </a:rPr>
+              <a:t>• Question 5</a:t>
+            </a:r>
+          </a:p>
+          <a:p>
+            <a:pPr algn="ctr"/>
+            <a:endParaRPr lang="en-US" dirty="0">
+              <a:latin typeface="Abadi" panose="020B0604020104020204" pitchFamily="34" charset="0"/>
+            </a:endParaRPr>
+          </a:p>
+          <a:p>
+            <a:pPr algn="ctr"/>
+            <a:r>
+              <a:rPr lang="en-US" dirty="0">
+                <a:latin typeface="Abadi" panose="020B0604020104020204" pitchFamily="34" charset="0"/>
+              </a:rPr>
+              <a:t>• Question 6</a:t>
+            </a:r>
+          </a:p>
+          <a:p>
+            <a:pPr algn="ctr"/>
+            <a:endParaRPr lang="en-US" dirty="0">
+              <a:latin typeface="Abadi" panose="020B0604020104020204" pitchFamily="34" charset="0"/>
+            </a:endParaRPr>
+          </a:p>
+          <a:p>
+            <a:pPr algn="ctr"/>
+            <a:r>
+              <a:rPr lang="en-US" dirty="0">
+                <a:latin typeface="Abadi" panose="020B0604020104020204" pitchFamily="34" charset="0"/>
+              </a:rPr>
+              <a:t>• Question 7</a:t>
+            </a:r>
+          </a:p>
+          <a:p>
+            <a:pPr algn="ctr"/>
+            <a:endParaRPr lang="en-US" dirty="0">
+              <a:latin typeface="Abadi" panose="020B0604020104020204" pitchFamily="34" charset="0"/>
+            </a:endParaRPr>
+          </a:p>
+          <a:p>
+            <a:pPr algn="ctr"/>
+            <a:r>
+              <a:rPr lang="en-US" dirty="0">
+                <a:latin typeface="Abadi" panose="020B0604020104020204" pitchFamily="34" charset="0"/>
+              </a:rPr>
+              <a:t>• Question 8</a:t>
+            </a:r>
+          </a:p>
+          <a:p>
+            <a:pPr algn="ctr"/>
+            <a:endParaRPr lang="en-US" dirty="0">
+              <a:latin typeface="Abadi" panose="020B0604020104020204" pitchFamily="34" charset="0"/>
+            </a:endParaRPr>
+          </a:p>
+          <a:p>
+            <a:pPr algn="ctr"/>
+            <a:r>
+              <a:rPr lang="en-US" dirty="0">
+                <a:latin typeface="Abadi" panose="020B0604020104020204" pitchFamily="34" charset="0"/>
+              </a:rPr>
+              <a:t>• Question 9</a:t>
+            </a:r>
+          </a:p>
+          <a:p>
+            <a:pPr algn="ctr"/>
+            <a:endParaRPr lang="en-US" dirty="0">
+              <a:latin typeface="Abadi" panose="020B0604020104020204" pitchFamily="34" charset="0"/>
+            </a:endParaRPr>
+          </a:p>
+          <a:p>
+            <a:pPr algn="ctr"/>
+            <a:r>
+              <a:rPr lang="en-US" dirty="0">
+                <a:latin typeface="Abadi" panose="020B0604020104020204" pitchFamily="34" charset="0"/>
+              </a:rPr>
+              <a:t>• Question 10</a:t>
+            </a:r>
+            <a:endParaRPr lang="en-GB" dirty="0">
+              <a:latin typeface="Abadi" panose="020B0604020104020204" pitchFamily="34" charset="0"/>
+            </a:endParaRPr>
+          </a:p>
+        </p:txBody>
+      </p:sp>
+      <p:sp>
+        <p:nvSpPr>
+          <p:cNvPr id="10" name="BlokTextu 9">
+            <a:extLst>
+              <a:ext uri="{FF2B5EF4-FFF2-40B4-BE49-F238E27FC236}">
+                <a16:creationId xmlns:a16="http://schemas.microsoft.com/office/drawing/2014/main" id="{34DC92CB-D2AB-4FDB-A9CB-959A6EC28230}"/>
+              </a:ext>
+            </a:extLst>
+          </p:cNvPr>
+          <p:cNvSpPr txBox="1"/>
+          <p:nvPr/>
+        </p:nvSpPr>
+        <p:spPr>
+          <a:xfrm>
+            <a:off x="2026226" y="1291861"/>
+            <a:ext cx="7017328" cy="1107996"/>
+          </a:xfrm>
+          <a:prstGeom prst="rect">
+            <a:avLst/>
+          </a:prstGeom>
+          <a:noFill/>
+        </p:spPr>
+        <p:txBody>
+          <a:bodyPr wrap="square" rtlCol="0">
+            <a:spAutoFit/>
+          </a:bodyPr>
+          <a:lstStyle/>
+          <a:p>
+            <a:pPr algn="ctr"/>
+            <a:r>
+              <a:rPr lang="en-US" sz="2800" dirty="0"/>
+              <a:t>“I will make him an offer he can’t refuse.”</a:t>
+            </a:r>
+          </a:p>
+          <a:p>
+            <a:pPr algn="ctr"/>
+            <a:r>
+              <a:rPr lang="en-US" sz="2000" dirty="0"/>
+              <a:t>In which movie did this quote occur?</a:t>
+            </a:r>
+          </a:p>
+          <a:p>
+            <a:pPr algn="ctr"/>
+            <a:endParaRPr lang="en-US" dirty="0"/>
+          </a:p>
+        </p:txBody>
+      </p:sp>
+      <p:grpSp>
+        <p:nvGrpSpPr>
+          <p:cNvPr id="15" name="Skupina 14">
+            <a:extLst>
+              <a:ext uri="{FF2B5EF4-FFF2-40B4-BE49-F238E27FC236}">
+                <a16:creationId xmlns:a16="http://schemas.microsoft.com/office/drawing/2014/main" id="{0CC1B712-E738-4FB0-86DB-4ECA09FCD4CB}"/>
+              </a:ext>
+            </a:extLst>
+          </p:cNvPr>
+          <p:cNvGrpSpPr/>
+          <p:nvPr/>
+        </p:nvGrpSpPr>
+        <p:grpSpPr>
+          <a:xfrm>
+            <a:off x="4651663" y="5003731"/>
+            <a:ext cx="1766454" cy="644236"/>
+            <a:chOff x="4651663" y="5452994"/>
+            <a:chExt cx="1766454" cy="644236"/>
+          </a:xfrm>
+        </p:grpSpPr>
+        <p:sp>
+          <p:nvSpPr>
+            <p:cNvPr id="11" name="Obdĺžnik: zaoblené rohy 10">
+              <a:extLst>
+                <a:ext uri="{FF2B5EF4-FFF2-40B4-BE49-F238E27FC236}">
+                  <a16:creationId xmlns:a16="http://schemas.microsoft.com/office/drawing/2014/main" id="{B1922857-C6CA-41C7-8387-614BC1E5F97B}"/>
+                </a:ext>
+              </a:extLst>
+            </p:cNvPr>
+            <p:cNvSpPr/>
+            <p:nvPr/>
+          </p:nvSpPr>
+          <p:spPr>
+            <a:xfrm>
+              <a:off x="4651663" y="5452994"/>
+              <a:ext cx="1766454" cy="644236"/>
+            </a:xfrm>
+            <a:prstGeom prst="roundRect">
+              <a:avLst/>
+            </a:prstGeom>
+            <a:solidFill>
+              <a:srgbClr val="3AAFA9"/>
+            </a:solidFill>
+            <a:ln>
+              <a:noFill/>
+            </a:ln>
+          </p:spPr>
+          <p:style>
+            <a:lnRef idx="2">
+              <a:schemeClr val="accent1">
+                <a:shade val="50000"/>
+              </a:schemeClr>
+            </a:lnRef>
+            <a:fillRef idx="1">
+              <a:schemeClr val="accent1"/>
+            </a:fillRef>
+            <a:effectRef idx="0">
+              <a:schemeClr val="accent1"/>
+            </a:effectRef>
+            <a:fontRef idx="minor">
+              <a:schemeClr val="lt1"/>
+            </a:fontRef>
+          </p:style>
+          <p:txBody>
+            <a:bodyPr rtlCol="0" anchor="ctr"/>
+            <a:lstStyle/>
+            <a:p>
+              <a:pPr algn="ctr"/>
+              <a:endParaRPr lang="en-GB"/>
+            </a:p>
+          </p:txBody>
+        </p:sp>
+        <p:sp>
+          <p:nvSpPr>
+            <p:cNvPr id="12" name="BlokTextu 11">
+              <a:extLst>
+                <a:ext uri="{FF2B5EF4-FFF2-40B4-BE49-F238E27FC236}">
+                  <a16:creationId xmlns:a16="http://schemas.microsoft.com/office/drawing/2014/main" id="{BCC0AB6E-7862-4DAF-98A0-1F50C1F4E158}"/>
+                </a:ext>
+              </a:extLst>
+            </p:cNvPr>
+            <p:cNvSpPr txBox="1"/>
+            <p:nvPr/>
+          </p:nvSpPr>
+          <p:spPr>
+            <a:xfrm>
+              <a:off x="4925724" y="5569786"/>
+              <a:ext cx="1222663" cy="461665"/>
+            </a:xfrm>
+            <a:prstGeom prst="rect">
+              <a:avLst/>
+            </a:prstGeom>
+            <a:noFill/>
+          </p:spPr>
+          <p:txBody>
+            <a:bodyPr wrap="square" rtlCol="0">
+              <a:spAutoFit/>
+            </a:bodyPr>
+            <a:lstStyle/>
+            <a:p>
+              <a:pPr algn="ctr"/>
+              <a:r>
+                <a:rPr lang="en-US" sz="2400" dirty="0"/>
+                <a:t>HINT</a:t>
+              </a:r>
+              <a:endParaRPr lang="en-GB" sz="2400" dirty="0"/>
+            </a:p>
+          </p:txBody>
+        </p:sp>
+      </p:grpSp>
+      <p:grpSp>
+        <p:nvGrpSpPr>
+          <p:cNvPr id="14" name="Skupina 13">
+            <a:extLst>
+              <a:ext uri="{FF2B5EF4-FFF2-40B4-BE49-F238E27FC236}">
+                <a16:creationId xmlns:a16="http://schemas.microsoft.com/office/drawing/2014/main" id="{F1500166-1CE6-418C-B79D-BCD36D3AF561}"/>
+              </a:ext>
+            </a:extLst>
+          </p:cNvPr>
+          <p:cNvGrpSpPr/>
+          <p:nvPr/>
+        </p:nvGrpSpPr>
+        <p:grpSpPr>
+          <a:xfrm>
+            <a:off x="2700476" y="2232080"/>
+            <a:ext cx="5668828" cy="2554545"/>
+            <a:chOff x="2459182" y="2884775"/>
+            <a:chExt cx="5668828" cy="2554545"/>
+          </a:xfrm>
+        </p:grpSpPr>
+        <p:sp>
+          <p:nvSpPr>
+            <p:cNvPr id="13" name="Tlačidlo akcie: prázdne 12">
+              <a:hlinkClick r:id="" action="ppaction://noaction" highlightClick="1"/>
+              <a:extLst>
+                <a:ext uri="{FF2B5EF4-FFF2-40B4-BE49-F238E27FC236}">
+                  <a16:creationId xmlns:a16="http://schemas.microsoft.com/office/drawing/2014/main" id="{B5F67077-5F8D-4D6F-87D1-0B369DFA1D4F}"/>
+                </a:ext>
+              </a:extLst>
+            </p:cNvPr>
+            <p:cNvSpPr/>
+            <p:nvPr/>
+          </p:nvSpPr>
+          <p:spPr>
+            <a:xfrm>
+              <a:off x="2459182" y="5119254"/>
+              <a:ext cx="277091" cy="268111"/>
+            </a:xfrm>
+            <a:prstGeom prst="actionButtonBlank">
+              <a:avLst/>
+            </a:prstGeom>
+            <a:solidFill>
+              <a:srgbClr val="3AAFA9"/>
+            </a:solidFill>
+            <a:ln>
+              <a:solidFill>
+                <a:schemeClr val="tx1">
+                  <a:lumMod val="95000"/>
+                  <a:lumOff val="5000"/>
+                </a:schemeClr>
+              </a:solidFill>
+            </a:ln>
+          </p:spPr>
+          <p:style>
+            <a:lnRef idx="2">
+              <a:schemeClr val="accent1">
+                <a:shade val="50000"/>
+              </a:schemeClr>
+            </a:lnRef>
+            <a:fillRef idx="1">
+              <a:schemeClr val="accent1"/>
+            </a:fillRef>
+            <a:effectRef idx="0">
+              <a:schemeClr val="accent1"/>
+            </a:effectRef>
+            <a:fontRef idx="minor">
+              <a:schemeClr val="lt1"/>
+            </a:fontRef>
+          </p:style>
+          <p:txBody>
+            <a:bodyPr rtlCol="0" anchor="ctr"/>
+            <a:lstStyle/>
+            <a:p>
+              <a:pPr algn="ctr"/>
+              <a:endParaRPr lang="en-GB"/>
+            </a:p>
+          </p:txBody>
+        </p:sp>
+        <p:sp>
+          <p:nvSpPr>
+            <p:cNvPr id="17" name="Tlačidlo akcie: prázdne 16">
+              <a:hlinkClick r:id="" action="ppaction://noaction" highlightClick="1"/>
+              <a:extLst>
+                <a:ext uri="{FF2B5EF4-FFF2-40B4-BE49-F238E27FC236}">
+                  <a16:creationId xmlns:a16="http://schemas.microsoft.com/office/drawing/2014/main" id="{654A2D1E-FE8C-40ED-AF3C-F36A61410F0C}"/>
+                </a:ext>
+              </a:extLst>
+            </p:cNvPr>
+            <p:cNvSpPr/>
+            <p:nvPr/>
+          </p:nvSpPr>
+          <p:spPr>
+            <a:xfrm>
+              <a:off x="2459182" y="3286222"/>
+              <a:ext cx="277091" cy="268111"/>
+            </a:xfrm>
+            <a:prstGeom prst="actionButtonBlank">
+              <a:avLst/>
+            </a:prstGeom>
+            <a:solidFill>
+              <a:srgbClr val="3AAFA9"/>
+            </a:solidFill>
+            <a:ln>
+              <a:solidFill>
+                <a:schemeClr val="tx1">
+                  <a:lumMod val="95000"/>
+                  <a:lumOff val="5000"/>
+                </a:schemeClr>
+              </a:solidFill>
+            </a:ln>
+          </p:spPr>
+          <p:style>
+            <a:lnRef idx="2">
+              <a:schemeClr val="accent1">
+                <a:shade val="50000"/>
+              </a:schemeClr>
+            </a:lnRef>
+            <a:fillRef idx="1">
+              <a:schemeClr val="accent1"/>
+            </a:fillRef>
+            <a:effectRef idx="0">
+              <a:schemeClr val="accent1"/>
+            </a:effectRef>
+            <a:fontRef idx="minor">
+              <a:schemeClr val="lt1"/>
+            </a:fontRef>
+          </p:style>
+          <p:txBody>
+            <a:bodyPr rtlCol="0" anchor="ctr"/>
+            <a:lstStyle/>
+            <a:p>
+              <a:pPr algn="ctr"/>
+              <a:endParaRPr lang="en-GB"/>
+            </a:p>
+          </p:txBody>
+        </p:sp>
+        <p:sp>
+          <p:nvSpPr>
+            <p:cNvPr id="18" name="Tlačidlo akcie: prázdne 17">
+              <a:hlinkClick r:id="" action="ppaction://noaction" highlightClick="1"/>
+              <a:extLst>
+                <a:ext uri="{FF2B5EF4-FFF2-40B4-BE49-F238E27FC236}">
+                  <a16:creationId xmlns:a16="http://schemas.microsoft.com/office/drawing/2014/main" id="{F5B1BC62-F187-4ED5-8050-33744B210A73}"/>
+                </a:ext>
+              </a:extLst>
+            </p:cNvPr>
+            <p:cNvSpPr/>
+            <p:nvPr/>
+          </p:nvSpPr>
+          <p:spPr>
+            <a:xfrm>
+              <a:off x="2459182" y="3872988"/>
+              <a:ext cx="277091" cy="268111"/>
+            </a:xfrm>
+            <a:prstGeom prst="actionButtonBlank">
+              <a:avLst/>
+            </a:prstGeom>
+            <a:solidFill>
+              <a:srgbClr val="3AAFA9"/>
+            </a:solidFill>
+            <a:ln>
+              <a:solidFill>
+                <a:schemeClr val="tx1">
+                  <a:lumMod val="95000"/>
+                  <a:lumOff val="5000"/>
+                </a:schemeClr>
+              </a:solidFill>
+            </a:ln>
+          </p:spPr>
+          <p:style>
+            <a:lnRef idx="2">
+              <a:schemeClr val="accent1">
+                <a:shade val="50000"/>
+              </a:schemeClr>
+            </a:lnRef>
+            <a:fillRef idx="1">
+              <a:schemeClr val="accent1"/>
+            </a:fillRef>
+            <a:effectRef idx="0">
+              <a:schemeClr val="accent1"/>
+            </a:effectRef>
+            <a:fontRef idx="minor">
+              <a:schemeClr val="lt1"/>
+            </a:fontRef>
+          </p:style>
+          <p:txBody>
+            <a:bodyPr rtlCol="0" anchor="ctr"/>
+            <a:lstStyle/>
+            <a:p>
+              <a:pPr algn="ctr"/>
+              <a:endParaRPr lang="en-GB"/>
+            </a:p>
+          </p:txBody>
+        </p:sp>
+        <p:sp>
+          <p:nvSpPr>
+            <p:cNvPr id="19" name="Tlačidlo akcie: prázdne 18">
+              <a:hlinkClick r:id="" action="ppaction://noaction" highlightClick="1"/>
+              <a:extLst>
+                <a:ext uri="{FF2B5EF4-FFF2-40B4-BE49-F238E27FC236}">
+                  <a16:creationId xmlns:a16="http://schemas.microsoft.com/office/drawing/2014/main" id="{914A377B-9FB4-40DC-A449-1AB64E2E6622}"/>
+                </a:ext>
+              </a:extLst>
+            </p:cNvPr>
+            <p:cNvSpPr/>
+            <p:nvPr/>
+          </p:nvSpPr>
+          <p:spPr>
+            <a:xfrm>
+              <a:off x="2459182" y="4532490"/>
+              <a:ext cx="277091" cy="268111"/>
+            </a:xfrm>
+            <a:prstGeom prst="actionButtonBlank">
+              <a:avLst/>
+            </a:prstGeom>
+            <a:solidFill>
+              <a:srgbClr val="3AAFA9"/>
+            </a:solidFill>
+            <a:ln>
+              <a:solidFill>
+                <a:schemeClr val="tx1">
+                  <a:lumMod val="95000"/>
+                  <a:lumOff val="5000"/>
+                </a:schemeClr>
+              </a:solidFill>
+            </a:ln>
+          </p:spPr>
+          <p:style>
+            <a:lnRef idx="2">
+              <a:schemeClr val="accent1">
+                <a:shade val="50000"/>
+              </a:schemeClr>
+            </a:lnRef>
+            <a:fillRef idx="1">
+              <a:schemeClr val="accent1"/>
+            </a:fillRef>
+            <a:effectRef idx="0">
+              <a:schemeClr val="accent1"/>
+            </a:effectRef>
+            <a:fontRef idx="minor">
+              <a:schemeClr val="lt1"/>
+            </a:fontRef>
+          </p:style>
+          <p:txBody>
+            <a:bodyPr rtlCol="0" anchor="ctr"/>
+            <a:lstStyle/>
+            <a:p>
+              <a:pPr algn="ctr"/>
+              <a:endParaRPr lang="en-GB"/>
+            </a:p>
+          </p:txBody>
+        </p:sp>
+        <p:sp>
+          <p:nvSpPr>
+            <p:cNvPr id="20" name="BlokTextu 19">
+              <a:extLst>
+                <a:ext uri="{FF2B5EF4-FFF2-40B4-BE49-F238E27FC236}">
+                  <a16:creationId xmlns:a16="http://schemas.microsoft.com/office/drawing/2014/main" id="{0476CA55-9A5B-4BBF-A545-211248925810}"/>
+                </a:ext>
+              </a:extLst>
+            </p:cNvPr>
+            <p:cNvSpPr txBox="1"/>
+            <p:nvPr/>
+          </p:nvSpPr>
+          <p:spPr>
+            <a:xfrm>
+              <a:off x="2941770" y="2884775"/>
+              <a:ext cx="5186240" cy="2554545"/>
+            </a:xfrm>
+            <a:prstGeom prst="rect">
+              <a:avLst/>
+            </a:prstGeom>
+            <a:noFill/>
+          </p:spPr>
+          <p:txBody>
+            <a:bodyPr wrap="square" rtlCol="0">
+              <a:spAutoFit/>
+            </a:bodyPr>
+            <a:lstStyle/>
+            <a:p>
+              <a:endParaRPr lang="en-US" sz="2000" dirty="0"/>
+            </a:p>
+            <a:p>
+              <a:pPr marL="457200" indent="-457200">
+                <a:buAutoNum type="alphaLcParenR"/>
+              </a:pPr>
+              <a:r>
+                <a:rPr lang="en-US" sz="2000" dirty="0"/>
+                <a:t>Star Wars Episode III – Revenge of the Sith</a:t>
+              </a:r>
+            </a:p>
+            <a:p>
+              <a:pPr marL="457200" indent="-457200">
+                <a:buAutoNum type="alphaLcParenR"/>
+              </a:pPr>
+              <a:endParaRPr lang="en-US" sz="2000" dirty="0"/>
+            </a:p>
+            <a:p>
+              <a:pPr marL="457200" indent="-457200">
+                <a:buAutoNum type="alphaLcParenR"/>
+              </a:pPr>
+              <a:r>
+                <a:rPr lang="en-US" sz="2000" dirty="0"/>
+                <a:t>The Truman Show</a:t>
+              </a:r>
+            </a:p>
+            <a:p>
+              <a:pPr marL="457200" indent="-457200">
+                <a:buAutoNum type="alphaLcParenR"/>
+              </a:pPr>
+              <a:endParaRPr lang="en-US" sz="2000" dirty="0"/>
+            </a:p>
+            <a:p>
+              <a:pPr marL="457200" indent="-457200">
+                <a:buAutoNum type="alphaLcParenR"/>
+              </a:pPr>
+              <a:r>
+                <a:rPr lang="en-US" sz="2000" dirty="0"/>
+                <a:t>The Godfather</a:t>
+              </a:r>
+            </a:p>
+            <a:p>
+              <a:pPr marL="457200" indent="-457200">
+                <a:buAutoNum type="alphaLcParenR"/>
+              </a:pPr>
+              <a:endParaRPr lang="en-US" sz="2000" dirty="0"/>
+            </a:p>
+            <a:p>
+              <a:pPr marL="457200" indent="-457200">
+                <a:buAutoNum type="alphaLcParenR"/>
+              </a:pPr>
+              <a:r>
+                <a:rPr lang="en-US" sz="2000" dirty="0"/>
+                <a:t>The Irishman</a:t>
+              </a:r>
+              <a:endParaRPr lang="en-GB" sz="2000" dirty="0"/>
+            </a:p>
+          </p:txBody>
+        </p:sp>
+      </p:grpSp>
+      <p:sp>
+        <p:nvSpPr>
+          <p:cNvPr id="21" name="Nadpis 1">
+            <a:extLst>
+              <a:ext uri="{FF2B5EF4-FFF2-40B4-BE49-F238E27FC236}">
+                <a16:creationId xmlns:a16="http://schemas.microsoft.com/office/drawing/2014/main" id="{C0090D4C-5FDA-4C6C-AAFA-CCB1ACE6EAD5}"/>
+              </a:ext>
+            </a:extLst>
+          </p:cNvPr>
+          <p:cNvSpPr txBox="1">
+            <a:spLocks/>
+          </p:cNvSpPr>
+          <p:nvPr/>
+        </p:nvSpPr>
+        <p:spPr>
+          <a:xfrm>
+            <a:off x="-72303" y="6213765"/>
+            <a:ext cx="12296774" cy="644235"/>
+          </a:xfrm>
+          <a:prstGeom prst="rect">
+            <a:avLst/>
+          </a:prstGeom>
+          <a:solidFill>
+            <a:schemeClr val="bg1">
+              <a:lumMod val="65000"/>
+            </a:schemeClr>
+          </a:solidFill>
+        </p:spPr>
+        <p:txBody>
+          <a:bodyPr vert="horz" lIns="91440" tIns="45720" rIns="91440" bIns="45720" rtlCol="0" anchor="b">
+            <a:normAutofit fontScale="77500" lnSpcReduction="20000"/>
+          </a:bodyPr>
+          <a:lstStyle>
+            <a:lvl1pPr algn="ctr" defTabSz="914400" rtl="0" eaLnBrk="1" latinLnBrk="0" hangingPunct="1">
+              <a:lnSpc>
+                <a:spcPct val="90000"/>
+              </a:lnSpc>
+              <a:spcBef>
+                <a:spcPct val="0"/>
+              </a:spcBef>
+              <a:buNone/>
+              <a:defRPr sz="6000" kern="1200">
+                <a:solidFill>
+                  <a:schemeClr val="tx1"/>
+                </a:solidFill>
+                <a:latin typeface="+mj-lt"/>
+                <a:ea typeface="+mj-ea"/>
+                <a:cs typeface="+mj-cs"/>
+              </a:defRPr>
+            </a:lvl1pPr>
+          </a:lstStyle>
+          <a:p>
+            <a:endParaRPr lang="en-GB" dirty="0">
+              <a:solidFill>
+                <a:schemeClr val="bg1"/>
+              </a:solidFill>
+              <a:latin typeface="Script MT Bold" panose="03040602040607080904" pitchFamily="66" charset="0"/>
+              <a:cs typeface="Aharoni" panose="02010803020104030203" pitchFamily="2" charset="-79"/>
+            </a:endParaRPr>
+          </a:p>
+        </p:txBody>
+      </p:sp>
+      <p:grpSp>
+        <p:nvGrpSpPr>
+          <p:cNvPr id="27" name="Skupina 26">
+            <a:extLst>
+              <a:ext uri="{FF2B5EF4-FFF2-40B4-BE49-F238E27FC236}">
+                <a16:creationId xmlns:a16="http://schemas.microsoft.com/office/drawing/2014/main" id="{275ECF91-871A-40D1-AF91-419A1F6FD655}"/>
+              </a:ext>
+            </a:extLst>
+          </p:cNvPr>
+          <p:cNvGrpSpPr/>
+          <p:nvPr/>
+        </p:nvGrpSpPr>
+        <p:grpSpPr>
+          <a:xfrm>
+            <a:off x="5231532" y="6337433"/>
+            <a:ext cx="1728937" cy="396898"/>
+            <a:chOff x="5137016" y="6337433"/>
+            <a:chExt cx="1728937" cy="396898"/>
+          </a:xfrm>
+        </p:grpSpPr>
+        <p:pic>
+          <p:nvPicPr>
+            <p:cNvPr id="22" name="Obrázok 21">
+              <a:extLst>
+                <a:ext uri="{FF2B5EF4-FFF2-40B4-BE49-F238E27FC236}">
+                  <a16:creationId xmlns:a16="http://schemas.microsoft.com/office/drawing/2014/main" id="{0D7AF0E5-CF3D-4BF5-BFDB-95D215032B08}"/>
+                </a:ext>
+              </a:extLst>
+            </p:cNvPr>
+            <p:cNvPicPr>
+              <a:picLocks noChangeAspect="1"/>
+            </p:cNvPicPr>
+            <p:nvPr/>
+          </p:nvPicPr>
+          <p:blipFill>
+            <a:blip r:embed="rId5">
+              <a:extLst>
+                <a:ext uri="{28A0092B-C50C-407E-A947-70E740481C1C}">
+                  <a14:useLocalDpi xmlns:a14="http://schemas.microsoft.com/office/drawing/2010/main" val="0"/>
+                </a:ext>
+              </a:extLst>
+            </a:blip>
+            <a:stretch>
+              <a:fillRect/>
+            </a:stretch>
+          </p:blipFill>
+          <p:spPr>
+            <a:xfrm>
+              <a:off x="5137016" y="6337433"/>
+              <a:ext cx="396898" cy="396898"/>
+            </a:xfrm>
+            <a:prstGeom prst="rect">
+              <a:avLst/>
+            </a:prstGeom>
+          </p:spPr>
+        </p:pic>
+        <p:pic>
+          <p:nvPicPr>
+            <p:cNvPr id="24" name="Obrázok 23">
+              <a:extLst>
+                <a:ext uri="{FF2B5EF4-FFF2-40B4-BE49-F238E27FC236}">
+                  <a16:creationId xmlns:a16="http://schemas.microsoft.com/office/drawing/2014/main" id="{BE948C58-8A42-40BE-8E8D-C09D2DFE1801}"/>
+                </a:ext>
+              </a:extLst>
+            </p:cNvPr>
+            <p:cNvPicPr>
+              <a:picLocks noChangeAspect="1"/>
+            </p:cNvPicPr>
+            <p:nvPr/>
+          </p:nvPicPr>
+          <p:blipFill>
+            <a:blip r:embed="rId6">
+              <a:extLst>
+                <a:ext uri="{28A0092B-C50C-407E-A947-70E740481C1C}">
+                  <a14:useLocalDpi xmlns:a14="http://schemas.microsoft.com/office/drawing/2010/main" val="0"/>
+                </a:ext>
+              </a:extLst>
+            </a:blip>
+            <a:stretch>
+              <a:fillRect/>
+            </a:stretch>
+          </p:blipFill>
+          <p:spPr>
+            <a:xfrm>
+              <a:off x="6469055" y="6337433"/>
+              <a:ext cx="396898" cy="396898"/>
+            </a:xfrm>
+            <a:prstGeom prst="rect">
+              <a:avLst/>
+            </a:prstGeom>
+          </p:spPr>
+        </p:pic>
+        <p:pic>
+          <p:nvPicPr>
+            <p:cNvPr id="26" name="Obrázok 25">
+              <a:extLst>
+                <a:ext uri="{FF2B5EF4-FFF2-40B4-BE49-F238E27FC236}">
+                  <a16:creationId xmlns:a16="http://schemas.microsoft.com/office/drawing/2014/main" id="{6590A147-A8C7-4E3A-A4CB-F1134546E98B}"/>
+                </a:ext>
+              </a:extLst>
+            </p:cNvPr>
+            <p:cNvPicPr>
+              <a:picLocks noChangeAspect="1"/>
+            </p:cNvPicPr>
+            <p:nvPr/>
+          </p:nvPicPr>
+          <p:blipFill>
+            <a:blip r:embed="rId7">
+              <a:extLst>
+                <a:ext uri="{28A0092B-C50C-407E-A947-70E740481C1C}">
+                  <a14:useLocalDpi xmlns:a14="http://schemas.microsoft.com/office/drawing/2010/main" val="0"/>
+                </a:ext>
+              </a:extLst>
+            </a:blip>
+            <a:stretch>
+              <a:fillRect/>
+            </a:stretch>
+          </p:blipFill>
+          <p:spPr>
+            <a:xfrm>
+              <a:off x="5795376" y="6337433"/>
+              <a:ext cx="396898" cy="396898"/>
+            </a:xfrm>
+            <a:prstGeom prst="rect">
+              <a:avLst/>
+            </a:prstGeom>
+          </p:spPr>
+        </p:pic>
+      </p:grpSp>
     </p:spTree>
     <p:extLst>
       <p:ext uri="{BB962C8B-B14F-4D97-AF65-F5344CB8AC3E}">
         <p14:creationId xmlns:p14="http://schemas.microsoft.com/office/powerpoint/2010/main" val="3140683128"/>
+      </p:ext>
+    </p:extLst>
+  </p:cSld>
+  <p:clrMapOvr>
+    <a:masterClrMapping/>
+  </p:clrMapOvr>
+</p:sld>
+</file>
+
+<file path=ppt/slides/slide2.xml><?xml version="1.0" encoding="utf-8"?>
+<p:sld xmlns:a="http://schemas.openxmlformats.org/drawingml/2006/main" xmlns:r="http://schemas.openxmlformats.org/officeDocument/2006/relationships" xmlns:p="http://schemas.openxmlformats.org/presentationml/2006/main">
+  <p:cSld>
+    <p:spTree>
+      <p:nvGrpSpPr>
+        <p:cNvPr id="1" name=""/>
+        <p:cNvGrpSpPr/>
+        <p:nvPr/>
+      </p:nvGrpSpPr>
+      <p:grpSpPr>
+        <a:xfrm>
+          <a:off x="0" y="0"/>
+          <a:ext cx="0" cy="0"/>
+          <a:chOff x="0" y="0"/>
+          <a:chExt cx="0" cy="0"/>
+        </a:xfrm>
+      </p:grpSpPr>
+      <p:sp>
+        <p:nvSpPr>
+          <p:cNvPr id="4" name="Nadpis 1">
+            <a:extLst>
+              <a:ext uri="{FF2B5EF4-FFF2-40B4-BE49-F238E27FC236}">
+                <a16:creationId xmlns:a16="http://schemas.microsoft.com/office/drawing/2014/main" id="{25216B25-4061-49B0-B461-4ACA8DB990E1}"/>
+              </a:ext>
+            </a:extLst>
+          </p:cNvPr>
+          <p:cNvSpPr txBox="1">
+            <a:spLocks/>
+          </p:cNvSpPr>
+          <p:nvPr/>
+        </p:nvSpPr>
+        <p:spPr>
+          <a:xfrm>
+            <a:off x="3917371" y="1735281"/>
+            <a:ext cx="3034147" cy="3210791"/>
+          </a:xfrm>
+          <a:prstGeom prst="rect">
+            <a:avLst/>
+          </a:prstGeom>
+          <a:solidFill>
+            <a:srgbClr val="3AAFA9"/>
+          </a:solidFill>
+        </p:spPr>
+        <p:txBody>
+          <a:bodyPr vert="horz" lIns="91440" tIns="45720" rIns="91440" bIns="45720" rtlCol="0" anchor="ctr">
+            <a:normAutofit/>
+          </a:bodyPr>
+          <a:lstStyle>
+            <a:lvl1pPr algn="l" defTabSz="914400" rtl="0" eaLnBrk="1" latinLnBrk="0" hangingPunct="1">
+              <a:lnSpc>
+                <a:spcPct val="90000"/>
+              </a:lnSpc>
+              <a:spcBef>
+                <a:spcPct val="0"/>
+              </a:spcBef>
+              <a:buNone/>
+              <a:defRPr sz="4400" kern="1200">
+                <a:solidFill>
+                  <a:schemeClr val="tx1"/>
+                </a:solidFill>
+                <a:latin typeface="+mj-lt"/>
+                <a:ea typeface="+mj-ea"/>
+                <a:cs typeface="+mj-cs"/>
+              </a:defRPr>
+            </a:lvl1pPr>
+          </a:lstStyle>
+          <a:p>
+            <a:r>
+              <a:rPr lang="en-US" sz="20000" dirty="0">
+                <a:solidFill>
+                  <a:schemeClr val="bg1"/>
+                </a:solidFill>
+                <a:latin typeface="Script MT Bold" panose="03040602040607080904" pitchFamily="66" charset="0"/>
+                <a:cs typeface="Aharoni" panose="02010803020104030203" pitchFamily="2" charset="-79"/>
+              </a:rPr>
+              <a:t>M</a:t>
+            </a:r>
+            <a:endParaRPr lang="en-GB" sz="20000" dirty="0">
+              <a:solidFill>
+                <a:schemeClr val="bg1"/>
+              </a:solidFill>
+              <a:latin typeface="Script MT Bold" panose="03040602040607080904" pitchFamily="66" charset="0"/>
+              <a:cs typeface="Aharoni" panose="02010803020104030203" pitchFamily="2" charset="-79"/>
+            </a:endParaRPr>
+          </a:p>
+        </p:txBody>
+      </p:sp>
+    </p:spTree>
+    <p:extLst>
+      <p:ext uri="{BB962C8B-B14F-4D97-AF65-F5344CB8AC3E}">
+        <p14:creationId xmlns:p14="http://schemas.microsoft.com/office/powerpoint/2010/main" val="512804270"/>
       </p:ext>
     </p:extLst>
   </p:cSld>

</xml_diff>

<commit_message>
Working on the assessment report
</commit_message>
<xml_diff>
--- a/MovieQ Design.pptx
+++ b/MovieQ Design.pptx
@@ -6,7 +6,8 @@
   </p:sldMasterIdLst>
   <p:sldIdLst>
     <p:sldId id="256" r:id="rId2"/>
-    <p:sldId id="257" r:id="rId3"/>
+    <p:sldId id="258" r:id="rId3"/>
+    <p:sldId id="257" r:id="rId4"/>
   </p:sldIdLst>
   <p:sldSz cx="12192000" cy="6858000"/>
   <p:notesSz cx="6858000" cy="9144000"/>
@@ -262,7 +263,7 @@
           <a:p>
             <a:fld id="{7C86358E-79CC-484F-934D-4E3A2D61E8DF}" type="datetimeFigureOut">
               <a:rPr lang="en-GB" smtClean="0"/>
-              <a:t>21/02/2022</a:t>
+              <a:t>28/02/2022</a:t>
             </a:fld>
             <a:endParaRPr lang="en-GB"/>
           </a:p>
@@ -462,7 +463,7 @@
           <a:p>
             <a:fld id="{7C86358E-79CC-484F-934D-4E3A2D61E8DF}" type="datetimeFigureOut">
               <a:rPr lang="en-GB" smtClean="0"/>
-              <a:t>21/02/2022</a:t>
+              <a:t>28/02/2022</a:t>
             </a:fld>
             <a:endParaRPr lang="en-GB"/>
           </a:p>
@@ -672,7 +673,7 @@
           <a:p>
             <a:fld id="{7C86358E-79CC-484F-934D-4E3A2D61E8DF}" type="datetimeFigureOut">
               <a:rPr lang="en-GB" smtClean="0"/>
-              <a:t>21/02/2022</a:t>
+              <a:t>28/02/2022</a:t>
             </a:fld>
             <a:endParaRPr lang="en-GB"/>
           </a:p>
@@ -872,7 +873,7 @@
           <a:p>
             <a:fld id="{7C86358E-79CC-484F-934D-4E3A2D61E8DF}" type="datetimeFigureOut">
               <a:rPr lang="en-GB" smtClean="0"/>
-              <a:t>21/02/2022</a:t>
+              <a:t>28/02/2022</a:t>
             </a:fld>
             <a:endParaRPr lang="en-GB"/>
           </a:p>
@@ -1148,7 +1149,7 @@
           <a:p>
             <a:fld id="{7C86358E-79CC-484F-934D-4E3A2D61E8DF}" type="datetimeFigureOut">
               <a:rPr lang="en-GB" smtClean="0"/>
-              <a:t>21/02/2022</a:t>
+              <a:t>28/02/2022</a:t>
             </a:fld>
             <a:endParaRPr lang="en-GB"/>
           </a:p>
@@ -1416,7 +1417,7 @@
           <a:p>
             <a:fld id="{7C86358E-79CC-484F-934D-4E3A2D61E8DF}" type="datetimeFigureOut">
               <a:rPr lang="en-GB" smtClean="0"/>
-              <a:t>21/02/2022</a:t>
+              <a:t>28/02/2022</a:t>
             </a:fld>
             <a:endParaRPr lang="en-GB"/>
           </a:p>
@@ -1831,7 +1832,7 @@
           <a:p>
             <a:fld id="{7C86358E-79CC-484F-934D-4E3A2D61E8DF}" type="datetimeFigureOut">
               <a:rPr lang="en-GB" smtClean="0"/>
-              <a:t>21/02/2022</a:t>
+              <a:t>28/02/2022</a:t>
             </a:fld>
             <a:endParaRPr lang="en-GB"/>
           </a:p>
@@ -1973,7 +1974,7 @@
           <a:p>
             <a:fld id="{7C86358E-79CC-484F-934D-4E3A2D61E8DF}" type="datetimeFigureOut">
               <a:rPr lang="en-GB" smtClean="0"/>
-              <a:t>21/02/2022</a:t>
+              <a:t>28/02/2022</a:t>
             </a:fld>
             <a:endParaRPr lang="en-GB"/>
           </a:p>
@@ -2086,7 +2087,7 @@
           <a:p>
             <a:fld id="{7C86358E-79CC-484F-934D-4E3A2D61E8DF}" type="datetimeFigureOut">
               <a:rPr lang="en-GB" smtClean="0"/>
-              <a:t>21/02/2022</a:t>
+              <a:t>28/02/2022</a:t>
             </a:fld>
             <a:endParaRPr lang="en-GB"/>
           </a:p>
@@ -2399,7 +2400,7 @@
           <a:p>
             <a:fld id="{7C86358E-79CC-484F-934D-4E3A2D61E8DF}" type="datetimeFigureOut">
               <a:rPr lang="en-GB" smtClean="0"/>
-              <a:t>21/02/2022</a:t>
+              <a:t>28/02/2022</a:t>
             </a:fld>
             <a:endParaRPr lang="en-GB"/>
           </a:p>
@@ -2688,7 +2689,7 @@
           <a:p>
             <a:fld id="{7C86358E-79CC-484F-934D-4E3A2D61E8DF}" type="datetimeFigureOut">
               <a:rPr lang="en-GB" smtClean="0"/>
-              <a:t>21/02/2022</a:t>
+              <a:t>28/02/2022</a:t>
             </a:fld>
             <a:endParaRPr lang="en-GB"/>
           </a:p>
@@ -2931,7 +2932,7 @@
           <a:p>
             <a:fld id="{7C86358E-79CC-484F-934D-4E3A2D61E8DF}" type="datetimeFigureOut">
               <a:rPr lang="en-GB" smtClean="0"/>
-              <a:t>21/02/2022</a:t>
+              <a:t>28/02/2022</a:t>
             </a:fld>
             <a:endParaRPr lang="en-GB"/>
           </a:p>
@@ -4441,6 +4442,1316 @@
 <file path=ppt/slides/slide2.xml><?xml version="1.0" encoding="utf-8"?>
 <p:sld xmlns:a="http://schemas.openxmlformats.org/drawingml/2006/main" xmlns:r="http://schemas.openxmlformats.org/officeDocument/2006/relationships" xmlns:p="http://schemas.openxmlformats.org/presentationml/2006/main">
   <p:cSld>
+    <p:bg>
+      <p:bgPr>
+        <a:solidFill>
+          <a:schemeClr val="bg1">
+            <a:lumMod val="95000"/>
+          </a:schemeClr>
+        </a:solidFill>
+        <a:effectLst/>
+      </p:bgPr>
+    </p:bg>
+    <p:spTree>
+      <p:nvGrpSpPr>
+        <p:cNvPr id="1" name=""/>
+        <p:cNvGrpSpPr/>
+        <p:nvPr/>
+      </p:nvGrpSpPr>
+      <p:grpSpPr>
+        <a:xfrm>
+          <a:off x="0" y="0"/>
+          <a:ext cx="0" cy="0"/>
+          <a:chOff x="0" y="0"/>
+          <a:chExt cx="0" cy="0"/>
+        </a:xfrm>
+      </p:grpSpPr>
+      <p:sp>
+        <p:nvSpPr>
+          <p:cNvPr id="2" name="Nadpis 1">
+            <a:extLst>
+              <a:ext uri="{FF2B5EF4-FFF2-40B4-BE49-F238E27FC236}">
+                <a16:creationId xmlns:a16="http://schemas.microsoft.com/office/drawing/2014/main" id="{993C9593-4C4A-49D2-8C8F-2B24C38EDFB7}"/>
+              </a:ext>
+            </a:extLst>
+          </p:cNvPr>
+          <p:cNvSpPr>
+            <a:spLocks noGrp="1"/>
+          </p:cNvSpPr>
+          <p:nvPr>
+            <p:ph type="ctrTitle"/>
+          </p:nvPr>
+        </p:nvSpPr>
+        <p:spPr>
+          <a:xfrm>
+            <a:off x="-104774" y="-42598"/>
+            <a:ext cx="12296774" cy="971550"/>
+          </a:xfrm>
+          <a:solidFill>
+            <a:srgbClr val="3AAFA9"/>
+          </a:solidFill>
+        </p:spPr>
+        <p:txBody>
+          <a:bodyPr/>
+          <a:lstStyle/>
+          <a:p>
+            <a:r>
+              <a:rPr lang="en-US" dirty="0">
+                <a:solidFill>
+                  <a:schemeClr val="bg1"/>
+                </a:solidFill>
+                <a:latin typeface="Script MT Bold" panose="03040602040607080904" pitchFamily="66" charset="0"/>
+                <a:cs typeface="Aharoni" panose="02010803020104030203" pitchFamily="2" charset="-79"/>
+              </a:rPr>
+              <a:t>MovieQ</a:t>
+            </a:r>
+            <a:endParaRPr lang="en-GB" dirty="0">
+              <a:solidFill>
+                <a:schemeClr val="bg1"/>
+              </a:solidFill>
+              <a:latin typeface="Script MT Bold" panose="03040602040607080904" pitchFamily="66" charset="0"/>
+              <a:cs typeface="Aharoni" panose="02010803020104030203" pitchFamily="2" charset="-79"/>
+            </a:endParaRPr>
+          </a:p>
+        </p:txBody>
+      </p:sp>
+      <p:pic>
+        <p:nvPicPr>
+          <p:cNvPr id="1026" name="Picture 2" descr="Menu Icon White Transparent – Free PNG Images Vector, PSD, Clipart,  Templates">
+            <a:extLst>
+              <a:ext uri="{FF2B5EF4-FFF2-40B4-BE49-F238E27FC236}">
+                <a16:creationId xmlns:a16="http://schemas.microsoft.com/office/drawing/2014/main" id="{3B072895-10EE-4F7A-A358-D5E9ED5DD9A8}"/>
+              </a:ext>
+            </a:extLst>
+          </p:cNvPr>
+          <p:cNvPicPr>
+            <a:picLocks noChangeAspect="1" noChangeArrowheads="1"/>
+          </p:cNvPicPr>
+          <p:nvPr/>
+        </p:nvPicPr>
+        <p:blipFill>
+          <a:blip r:embed="rId2">
+            <a:extLst>
+              <a:ext uri="{28A0092B-C50C-407E-A947-70E740481C1C}">
+                <a14:useLocalDpi xmlns:a14="http://schemas.microsoft.com/office/drawing/2010/main" val="0"/>
+              </a:ext>
+            </a:extLst>
+          </a:blip>
+          <a:srcRect/>
+          <a:stretch>
+            <a:fillRect/>
+          </a:stretch>
+        </p:blipFill>
+        <p:spPr bwMode="auto">
+          <a:xfrm>
+            <a:off x="16509780" y="-4478932"/>
+            <a:ext cx="83493" cy="56497"/>
+          </a:xfrm>
+          <a:prstGeom prst="rect">
+            <a:avLst/>
+          </a:prstGeom>
+          <a:noFill/>
+          <a:extLst>
+            <a:ext uri="{909E8E84-426E-40DD-AFC4-6F175D3DCCD1}">
+              <a14:hiddenFill xmlns:a14="http://schemas.microsoft.com/office/drawing/2010/main">
+                <a:solidFill>
+                  <a:srgbClr val="FFFFFF"/>
+                </a:solidFill>
+              </a14:hiddenFill>
+            </a:ext>
+          </a:extLst>
+        </p:spPr>
+      </p:pic>
+      <p:pic>
+        <p:nvPicPr>
+          <p:cNvPr id="1028" name="Picture 4" descr="Hamburger Menu Icon Png White #100709 - Free Icons Library">
+            <a:extLst>
+              <a:ext uri="{FF2B5EF4-FFF2-40B4-BE49-F238E27FC236}">
+                <a16:creationId xmlns:a16="http://schemas.microsoft.com/office/drawing/2014/main" id="{5A20EA95-841F-4C6E-93B8-5B779101851D}"/>
+              </a:ext>
+            </a:extLst>
+          </p:cNvPr>
+          <p:cNvPicPr>
+            <a:picLocks noChangeAspect="1" noChangeArrowheads="1"/>
+          </p:cNvPicPr>
+          <p:nvPr/>
+        </p:nvPicPr>
+        <p:blipFill>
+          <a:blip r:embed="rId3">
+            <a:extLst>
+              <a:ext uri="{28A0092B-C50C-407E-A947-70E740481C1C}">
+                <a14:useLocalDpi xmlns:a14="http://schemas.microsoft.com/office/drawing/2010/main" val="0"/>
+              </a:ext>
+            </a:extLst>
+          </a:blip>
+          <a:srcRect/>
+          <a:stretch>
+            <a:fillRect/>
+          </a:stretch>
+        </p:blipFill>
+        <p:spPr bwMode="auto">
+          <a:xfrm>
+            <a:off x="14344651" y="-2125043"/>
+            <a:ext cx="161739" cy="161739"/>
+          </a:xfrm>
+          <a:prstGeom prst="rect">
+            <a:avLst/>
+          </a:prstGeom>
+          <a:noFill/>
+          <a:extLst>
+            <a:ext uri="{909E8E84-426E-40DD-AFC4-6F175D3DCCD1}">
+              <a14:hiddenFill xmlns:a14="http://schemas.microsoft.com/office/drawing/2010/main">
+                <a:solidFill>
+                  <a:srgbClr val="FFFFFF"/>
+                </a:solidFill>
+              </a14:hiddenFill>
+            </a:ext>
+          </a:extLst>
+        </p:spPr>
+      </p:pic>
+      <p:pic>
+        <p:nvPicPr>
+          <p:cNvPr id="1030" name="Picture 6" descr="Hamburger, menu, minimal, ui icon - Download on Iconfinder">
+            <a:extLst>
+              <a:ext uri="{FF2B5EF4-FFF2-40B4-BE49-F238E27FC236}">
+                <a16:creationId xmlns:a16="http://schemas.microsoft.com/office/drawing/2014/main" id="{415B63D3-32CC-4AF3-AE1E-F9BDDD70C6D0}"/>
+              </a:ext>
+            </a:extLst>
+          </p:cNvPr>
+          <p:cNvPicPr>
+            <a:picLocks noChangeAspect="1" noChangeArrowheads="1"/>
+          </p:cNvPicPr>
+          <p:nvPr/>
+        </p:nvPicPr>
+        <p:blipFill>
+          <a:blip r:embed="rId4">
+            <a:alphaModFix/>
+            <a:extLst>
+              <a:ext uri="{28A0092B-C50C-407E-A947-70E740481C1C}">
+                <a14:useLocalDpi xmlns:a14="http://schemas.microsoft.com/office/drawing/2010/main" val="0"/>
+              </a:ext>
+            </a:extLst>
+          </a:blip>
+          <a:srcRect/>
+          <a:stretch>
+            <a:fillRect/>
+          </a:stretch>
+        </p:blipFill>
+        <p:spPr bwMode="auto">
+          <a:xfrm>
+            <a:off x="11249026" y="114012"/>
+            <a:ext cx="658330" cy="658330"/>
+          </a:xfrm>
+          <a:prstGeom prst="rect">
+            <a:avLst/>
+          </a:prstGeom>
+          <a:solidFill>
+            <a:srgbClr val="A6A6A6"/>
+          </a:solidFill>
+          <a:effectLst>
+            <a:softEdge rad="38100"/>
+          </a:effectLst>
+        </p:spPr>
+      </p:pic>
+      <p:sp>
+        <p:nvSpPr>
+          <p:cNvPr id="4" name="BlokTextu 3">
+            <a:extLst>
+              <a:ext uri="{FF2B5EF4-FFF2-40B4-BE49-F238E27FC236}">
+                <a16:creationId xmlns:a16="http://schemas.microsoft.com/office/drawing/2014/main" id="{2B20C0EF-949E-437F-A2F2-780552DE347C}"/>
+              </a:ext>
+            </a:extLst>
+          </p:cNvPr>
+          <p:cNvSpPr txBox="1"/>
+          <p:nvPr/>
+        </p:nvSpPr>
+        <p:spPr>
+          <a:xfrm>
+            <a:off x="10171523" y="928952"/>
+            <a:ext cx="2020478" cy="5632311"/>
+          </a:xfrm>
+          <a:prstGeom prst="rect">
+            <a:avLst/>
+          </a:prstGeom>
+          <a:solidFill>
+            <a:srgbClr val="CBEAE8"/>
+          </a:solidFill>
+          <a:ln>
+            <a:solidFill>
+              <a:srgbClr val="CBEAE8"/>
+            </a:solidFill>
+          </a:ln>
+        </p:spPr>
+        <p:txBody>
+          <a:bodyPr wrap="square" rtlCol="0">
+            <a:spAutoFit/>
+          </a:bodyPr>
+          <a:lstStyle/>
+          <a:p>
+            <a:pPr algn="ctr"/>
+            <a:endParaRPr lang="en-US" dirty="0">
+              <a:latin typeface="Abadi" panose="020B0604020104020204" pitchFamily="34" charset="0"/>
+            </a:endParaRPr>
+          </a:p>
+          <a:p>
+            <a:pPr algn="ctr"/>
+            <a:r>
+              <a:rPr lang="en-US" dirty="0">
+                <a:latin typeface="Abadi" panose="020B0604020104020204" pitchFamily="34" charset="0"/>
+              </a:rPr>
+              <a:t>• Question 1</a:t>
+            </a:r>
+          </a:p>
+          <a:p>
+            <a:pPr algn="ctr"/>
+            <a:endParaRPr lang="en-US" dirty="0">
+              <a:latin typeface="Abadi" panose="020B0604020104020204" pitchFamily="34" charset="0"/>
+            </a:endParaRPr>
+          </a:p>
+          <a:p>
+            <a:pPr algn="ctr"/>
+            <a:r>
+              <a:rPr lang="en-US" dirty="0">
+                <a:latin typeface="Abadi" panose="020B0604020104020204" pitchFamily="34" charset="0"/>
+              </a:rPr>
+              <a:t>• Question 2</a:t>
+            </a:r>
+          </a:p>
+          <a:p>
+            <a:pPr algn="ctr"/>
+            <a:endParaRPr lang="en-US" dirty="0">
+              <a:latin typeface="Abadi" panose="020B0604020104020204" pitchFamily="34" charset="0"/>
+            </a:endParaRPr>
+          </a:p>
+          <a:p>
+            <a:pPr algn="ctr"/>
+            <a:r>
+              <a:rPr lang="en-US" dirty="0">
+                <a:latin typeface="Abadi" panose="020B0604020104020204" pitchFamily="34" charset="0"/>
+              </a:rPr>
+              <a:t>• Question 3</a:t>
+            </a:r>
+          </a:p>
+          <a:p>
+            <a:pPr algn="ctr"/>
+            <a:endParaRPr lang="en-US" dirty="0">
+              <a:latin typeface="Abadi" panose="020B0604020104020204" pitchFamily="34" charset="0"/>
+            </a:endParaRPr>
+          </a:p>
+          <a:p>
+            <a:pPr algn="ctr"/>
+            <a:r>
+              <a:rPr lang="en-US" dirty="0">
+                <a:latin typeface="Abadi" panose="020B0604020104020204" pitchFamily="34" charset="0"/>
+              </a:rPr>
+              <a:t>• Question 4</a:t>
+            </a:r>
+          </a:p>
+          <a:p>
+            <a:pPr algn="ctr"/>
+            <a:endParaRPr lang="en-US" dirty="0">
+              <a:latin typeface="Abadi" panose="020B0604020104020204" pitchFamily="34" charset="0"/>
+            </a:endParaRPr>
+          </a:p>
+          <a:p>
+            <a:pPr algn="ctr"/>
+            <a:r>
+              <a:rPr lang="en-US" dirty="0">
+                <a:latin typeface="Abadi" panose="020B0604020104020204" pitchFamily="34" charset="0"/>
+              </a:rPr>
+              <a:t>• Question 5</a:t>
+            </a:r>
+          </a:p>
+          <a:p>
+            <a:pPr algn="ctr"/>
+            <a:endParaRPr lang="en-US" dirty="0">
+              <a:latin typeface="Abadi" panose="020B0604020104020204" pitchFamily="34" charset="0"/>
+            </a:endParaRPr>
+          </a:p>
+          <a:p>
+            <a:pPr algn="ctr"/>
+            <a:r>
+              <a:rPr lang="en-US" dirty="0">
+                <a:latin typeface="Abadi" panose="020B0604020104020204" pitchFamily="34" charset="0"/>
+              </a:rPr>
+              <a:t>• Question 6</a:t>
+            </a:r>
+          </a:p>
+          <a:p>
+            <a:pPr algn="ctr"/>
+            <a:endParaRPr lang="en-US" dirty="0">
+              <a:latin typeface="Abadi" panose="020B0604020104020204" pitchFamily="34" charset="0"/>
+            </a:endParaRPr>
+          </a:p>
+          <a:p>
+            <a:pPr algn="ctr"/>
+            <a:r>
+              <a:rPr lang="en-US" dirty="0">
+                <a:latin typeface="Abadi" panose="020B0604020104020204" pitchFamily="34" charset="0"/>
+              </a:rPr>
+              <a:t>• Question 7</a:t>
+            </a:r>
+          </a:p>
+          <a:p>
+            <a:pPr algn="ctr"/>
+            <a:endParaRPr lang="en-US" dirty="0">
+              <a:latin typeface="Abadi" panose="020B0604020104020204" pitchFamily="34" charset="0"/>
+            </a:endParaRPr>
+          </a:p>
+          <a:p>
+            <a:pPr algn="ctr"/>
+            <a:r>
+              <a:rPr lang="en-US" dirty="0">
+                <a:latin typeface="Abadi" panose="020B0604020104020204" pitchFamily="34" charset="0"/>
+              </a:rPr>
+              <a:t>• Question 8</a:t>
+            </a:r>
+          </a:p>
+          <a:p>
+            <a:pPr algn="ctr"/>
+            <a:endParaRPr lang="en-US" dirty="0">
+              <a:latin typeface="Abadi" panose="020B0604020104020204" pitchFamily="34" charset="0"/>
+            </a:endParaRPr>
+          </a:p>
+          <a:p>
+            <a:pPr algn="ctr"/>
+            <a:r>
+              <a:rPr lang="en-US" dirty="0">
+                <a:latin typeface="Abadi" panose="020B0604020104020204" pitchFamily="34" charset="0"/>
+              </a:rPr>
+              <a:t>• Question 9</a:t>
+            </a:r>
+          </a:p>
+          <a:p>
+            <a:pPr algn="ctr"/>
+            <a:endParaRPr lang="en-US" dirty="0">
+              <a:latin typeface="Abadi" panose="020B0604020104020204" pitchFamily="34" charset="0"/>
+            </a:endParaRPr>
+          </a:p>
+          <a:p>
+            <a:pPr algn="ctr"/>
+            <a:r>
+              <a:rPr lang="en-US" dirty="0">
+                <a:latin typeface="Abadi" panose="020B0604020104020204" pitchFamily="34" charset="0"/>
+              </a:rPr>
+              <a:t>• Question 10</a:t>
+            </a:r>
+            <a:endParaRPr lang="en-GB" dirty="0">
+              <a:latin typeface="Abadi" panose="020B0604020104020204" pitchFamily="34" charset="0"/>
+            </a:endParaRPr>
+          </a:p>
+        </p:txBody>
+      </p:sp>
+      <p:sp>
+        <p:nvSpPr>
+          <p:cNvPr id="10" name="BlokTextu 9">
+            <a:extLst>
+              <a:ext uri="{FF2B5EF4-FFF2-40B4-BE49-F238E27FC236}">
+                <a16:creationId xmlns:a16="http://schemas.microsoft.com/office/drawing/2014/main" id="{34DC92CB-D2AB-4FDB-A9CB-959A6EC28230}"/>
+              </a:ext>
+            </a:extLst>
+          </p:cNvPr>
+          <p:cNvSpPr txBox="1"/>
+          <p:nvPr/>
+        </p:nvSpPr>
+        <p:spPr>
+          <a:xfrm>
+            <a:off x="2026226" y="1291861"/>
+            <a:ext cx="7017328" cy="1107996"/>
+          </a:xfrm>
+          <a:prstGeom prst="rect">
+            <a:avLst/>
+          </a:prstGeom>
+          <a:noFill/>
+        </p:spPr>
+        <p:txBody>
+          <a:bodyPr wrap="square" rtlCol="0">
+            <a:spAutoFit/>
+          </a:bodyPr>
+          <a:lstStyle/>
+          <a:p>
+            <a:pPr algn="ctr"/>
+            <a:r>
+              <a:rPr lang="en-US" sz="2800" dirty="0"/>
+              <a:t>“I will make him an offer he can’t refuse.”</a:t>
+            </a:r>
+          </a:p>
+          <a:p>
+            <a:pPr algn="ctr"/>
+            <a:r>
+              <a:rPr lang="en-US" sz="2000" dirty="0"/>
+              <a:t>In which movie did this quote occur?</a:t>
+            </a:r>
+          </a:p>
+          <a:p>
+            <a:pPr algn="ctr"/>
+            <a:endParaRPr lang="en-US" dirty="0"/>
+          </a:p>
+        </p:txBody>
+      </p:sp>
+      <p:grpSp>
+        <p:nvGrpSpPr>
+          <p:cNvPr id="15" name="Skupina 14">
+            <a:extLst>
+              <a:ext uri="{FF2B5EF4-FFF2-40B4-BE49-F238E27FC236}">
+                <a16:creationId xmlns:a16="http://schemas.microsoft.com/office/drawing/2014/main" id="{0CC1B712-E738-4FB0-86DB-4ECA09FCD4CB}"/>
+              </a:ext>
+            </a:extLst>
+          </p:cNvPr>
+          <p:cNvGrpSpPr/>
+          <p:nvPr/>
+        </p:nvGrpSpPr>
+        <p:grpSpPr>
+          <a:xfrm>
+            <a:off x="4651663" y="5003731"/>
+            <a:ext cx="1766454" cy="644236"/>
+            <a:chOff x="4651663" y="5452994"/>
+            <a:chExt cx="1766454" cy="644236"/>
+          </a:xfrm>
+        </p:grpSpPr>
+        <p:sp>
+          <p:nvSpPr>
+            <p:cNvPr id="11" name="Obdĺžnik: zaoblené rohy 10">
+              <a:extLst>
+                <a:ext uri="{FF2B5EF4-FFF2-40B4-BE49-F238E27FC236}">
+                  <a16:creationId xmlns:a16="http://schemas.microsoft.com/office/drawing/2014/main" id="{B1922857-C6CA-41C7-8387-614BC1E5F97B}"/>
+                </a:ext>
+              </a:extLst>
+            </p:cNvPr>
+            <p:cNvSpPr/>
+            <p:nvPr/>
+          </p:nvSpPr>
+          <p:spPr>
+            <a:xfrm>
+              <a:off x="4651663" y="5452994"/>
+              <a:ext cx="1766454" cy="644236"/>
+            </a:xfrm>
+            <a:prstGeom prst="roundRect">
+              <a:avLst/>
+            </a:prstGeom>
+            <a:solidFill>
+              <a:srgbClr val="3AAFA9"/>
+            </a:solidFill>
+            <a:ln>
+              <a:noFill/>
+            </a:ln>
+          </p:spPr>
+          <p:style>
+            <a:lnRef idx="2">
+              <a:schemeClr val="accent1">
+                <a:shade val="50000"/>
+              </a:schemeClr>
+            </a:lnRef>
+            <a:fillRef idx="1">
+              <a:schemeClr val="accent1"/>
+            </a:fillRef>
+            <a:effectRef idx="0">
+              <a:schemeClr val="accent1"/>
+            </a:effectRef>
+            <a:fontRef idx="minor">
+              <a:schemeClr val="lt1"/>
+            </a:fontRef>
+          </p:style>
+          <p:txBody>
+            <a:bodyPr rtlCol="0" anchor="ctr"/>
+            <a:lstStyle/>
+            <a:p>
+              <a:pPr algn="ctr"/>
+              <a:endParaRPr lang="en-GB"/>
+            </a:p>
+          </p:txBody>
+        </p:sp>
+        <p:sp>
+          <p:nvSpPr>
+            <p:cNvPr id="12" name="BlokTextu 11">
+              <a:extLst>
+                <a:ext uri="{FF2B5EF4-FFF2-40B4-BE49-F238E27FC236}">
+                  <a16:creationId xmlns:a16="http://schemas.microsoft.com/office/drawing/2014/main" id="{BCC0AB6E-7862-4DAF-98A0-1F50C1F4E158}"/>
+                </a:ext>
+              </a:extLst>
+            </p:cNvPr>
+            <p:cNvSpPr txBox="1"/>
+            <p:nvPr/>
+          </p:nvSpPr>
+          <p:spPr>
+            <a:xfrm>
+              <a:off x="4925724" y="5569786"/>
+              <a:ext cx="1222663" cy="461665"/>
+            </a:xfrm>
+            <a:prstGeom prst="rect">
+              <a:avLst/>
+            </a:prstGeom>
+            <a:noFill/>
+          </p:spPr>
+          <p:txBody>
+            <a:bodyPr wrap="square" rtlCol="0">
+              <a:spAutoFit/>
+            </a:bodyPr>
+            <a:lstStyle/>
+            <a:p>
+              <a:pPr algn="ctr"/>
+              <a:r>
+                <a:rPr lang="en-US" sz="2400" dirty="0"/>
+                <a:t>HINT</a:t>
+              </a:r>
+              <a:endParaRPr lang="en-GB" sz="2400" dirty="0"/>
+            </a:p>
+          </p:txBody>
+        </p:sp>
+      </p:grpSp>
+      <p:grpSp>
+        <p:nvGrpSpPr>
+          <p:cNvPr id="14" name="Skupina 13">
+            <a:extLst>
+              <a:ext uri="{FF2B5EF4-FFF2-40B4-BE49-F238E27FC236}">
+                <a16:creationId xmlns:a16="http://schemas.microsoft.com/office/drawing/2014/main" id="{F1500166-1CE6-418C-B79D-BCD36D3AF561}"/>
+              </a:ext>
+            </a:extLst>
+          </p:cNvPr>
+          <p:cNvGrpSpPr/>
+          <p:nvPr/>
+        </p:nvGrpSpPr>
+        <p:grpSpPr>
+          <a:xfrm>
+            <a:off x="2700476" y="2232080"/>
+            <a:ext cx="5668828" cy="2554545"/>
+            <a:chOff x="2459182" y="2884775"/>
+            <a:chExt cx="5668828" cy="2554545"/>
+          </a:xfrm>
+        </p:grpSpPr>
+        <p:sp>
+          <p:nvSpPr>
+            <p:cNvPr id="13" name="Tlačidlo akcie: prázdne 12">
+              <a:hlinkClick r:id="" action="ppaction://noaction" highlightClick="1"/>
+              <a:extLst>
+                <a:ext uri="{FF2B5EF4-FFF2-40B4-BE49-F238E27FC236}">
+                  <a16:creationId xmlns:a16="http://schemas.microsoft.com/office/drawing/2014/main" id="{B5F67077-5F8D-4D6F-87D1-0B369DFA1D4F}"/>
+                </a:ext>
+              </a:extLst>
+            </p:cNvPr>
+            <p:cNvSpPr/>
+            <p:nvPr/>
+          </p:nvSpPr>
+          <p:spPr>
+            <a:xfrm>
+              <a:off x="2459182" y="5119254"/>
+              <a:ext cx="277091" cy="268111"/>
+            </a:xfrm>
+            <a:prstGeom prst="actionButtonBlank">
+              <a:avLst/>
+            </a:prstGeom>
+            <a:solidFill>
+              <a:srgbClr val="3AAFA9"/>
+            </a:solidFill>
+            <a:ln>
+              <a:solidFill>
+                <a:schemeClr val="tx1">
+                  <a:lumMod val="95000"/>
+                  <a:lumOff val="5000"/>
+                </a:schemeClr>
+              </a:solidFill>
+            </a:ln>
+          </p:spPr>
+          <p:style>
+            <a:lnRef idx="2">
+              <a:schemeClr val="accent1">
+                <a:shade val="50000"/>
+              </a:schemeClr>
+            </a:lnRef>
+            <a:fillRef idx="1">
+              <a:schemeClr val="accent1"/>
+            </a:fillRef>
+            <a:effectRef idx="0">
+              <a:schemeClr val="accent1"/>
+            </a:effectRef>
+            <a:fontRef idx="minor">
+              <a:schemeClr val="lt1"/>
+            </a:fontRef>
+          </p:style>
+          <p:txBody>
+            <a:bodyPr rtlCol="0" anchor="ctr"/>
+            <a:lstStyle/>
+            <a:p>
+              <a:pPr algn="ctr"/>
+              <a:endParaRPr lang="en-GB"/>
+            </a:p>
+          </p:txBody>
+        </p:sp>
+        <p:sp>
+          <p:nvSpPr>
+            <p:cNvPr id="17" name="Tlačidlo akcie: prázdne 16">
+              <a:hlinkClick r:id="" action="ppaction://noaction" highlightClick="1"/>
+              <a:extLst>
+                <a:ext uri="{FF2B5EF4-FFF2-40B4-BE49-F238E27FC236}">
+                  <a16:creationId xmlns:a16="http://schemas.microsoft.com/office/drawing/2014/main" id="{654A2D1E-FE8C-40ED-AF3C-F36A61410F0C}"/>
+                </a:ext>
+              </a:extLst>
+            </p:cNvPr>
+            <p:cNvSpPr/>
+            <p:nvPr/>
+          </p:nvSpPr>
+          <p:spPr>
+            <a:xfrm>
+              <a:off x="2459182" y="3286222"/>
+              <a:ext cx="277091" cy="268111"/>
+            </a:xfrm>
+            <a:prstGeom prst="actionButtonBlank">
+              <a:avLst/>
+            </a:prstGeom>
+            <a:solidFill>
+              <a:srgbClr val="3AAFA9"/>
+            </a:solidFill>
+            <a:ln>
+              <a:solidFill>
+                <a:schemeClr val="tx1">
+                  <a:lumMod val="95000"/>
+                  <a:lumOff val="5000"/>
+                </a:schemeClr>
+              </a:solidFill>
+            </a:ln>
+          </p:spPr>
+          <p:style>
+            <a:lnRef idx="2">
+              <a:schemeClr val="accent1">
+                <a:shade val="50000"/>
+              </a:schemeClr>
+            </a:lnRef>
+            <a:fillRef idx="1">
+              <a:schemeClr val="accent1"/>
+            </a:fillRef>
+            <a:effectRef idx="0">
+              <a:schemeClr val="accent1"/>
+            </a:effectRef>
+            <a:fontRef idx="minor">
+              <a:schemeClr val="lt1"/>
+            </a:fontRef>
+          </p:style>
+          <p:txBody>
+            <a:bodyPr rtlCol="0" anchor="ctr"/>
+            <a:lstStyle/>
+            <a:p>
+              <a:pPr algn="ctr"/>
+              <a:endParaRPr lang="en-GB"/>
+            </a:p>
+          </p:txBody>
+        </p:sp>
+        <p:sp>
+          <p:nvSpPr>
+            <p:cNvPr id="18" name="Tlačidlo akcie: prázdne 17">
+              <a:hlinkClick r:id="" action="ppaction://noaction" highlightClick="1"/>
+              <a:extLst>
+                <a:ext uri="{FF2B5EF4-FFF2-40B4-BE49-F238E27FC236}">
+                  <a16:creationId xmlns:a16="http://schemas.microsoft.com/office/drawing/2014/main" id="{F5B1BC62-F187-4ED5-8050-33744B210A73}"/>
+                </a:ext>
+              </a:extLst>
+            </p:cNvPr>
+            <p:cNvSpPr/>
+            <p:nvPr/>
+          </p:nvSpPr>
+          <p:spPr>
+            <a:xfrm>
+              <a:off x="2459182" y="3872988"/>
+              <a:ext cx="277091" cy="268111"/>
+            </a:xfrm>
+            <a:prstGeom prst="actionButtonBlank">
+              <a:avLst/>
+            </a:prstGeom>
+            <a:solidFill>
+              <a:srgbClr val="3AAFA9"/>
+            </a:solidFill>
+            <a:ln>
+              <a:solidFill>
+                <a:schemeClr val="tx1">
+                  <a:lumMod val="95000"/>
+                  <a:lumOff val="5000"/>
+                </a:schemeClr>
+              </a:solidFill>
+            </a:ln>
+          </p:spPr>
+          <p:style>
+            <a:lnRef idx="2">
+              <a:schemeClr val="accent1">
+                <a:shade val="50000"/>
+              </a:schemeClr>
+            </a:lnRef>
+            <a:fillRef idx="1">
+              <a:schemeClr val="accent1"/>
+            </a:fillRef>
+            <a:effectRef idx="0">
+              <a:schemeClr val="accent1"/>
+            </a:effectRef>
+            <a:fontRef idx="minor">
+              <a:schemeClr val="lt1"/>
+            </a:fontRef>
+          </p:style>
+          <p:txBody>
+            <a:bodyPr rtlCol="0" anchor="ctr"/>
+            <a:lstStyle/>
+            <a:p>
+              <a:pPr algn="ctr"/>
+              <a:endParaRPr lang="en-GB"/>
+            </a:p>
+          </p:txBody>
+        </p:sp>
+        <p:sp>
+          <p:nvSpPr>
+            <p:cNvPr id="19" name="Tlačidlo akcie: prázdne 18">
+              <a:hlinkClick r:id="" action="ppaction://noaction" highlightClick="1"/>
+              <a:extLst>
+                <a:ext uri="{FF2B5EF4-FFF2-40B4-BE49-F238E27FC236}">
+                  <a16:creationId xmlns:a16="http://schemas.microsoft.com/office/drawing/2014/main" id="{914A377B-9FB4-40DC-A449-1AB64E2E6622}"/>
+                </a:ext>
+              </a:extLst>
+            </p:cNvPr>
+            <p:cNvSpPr/>
+            <p:nvPr/>
+          </p:nvSpPr>
+          <p:spPr>
+            <a:xfrm>
+              <a:off x="2459182" y="4532490"/>
+              <a:ext cx="277091" cy="268111"/>
+            </a:xfrm>
+            <a:prstGeom prst="actionButtonBlank">
+              <a:avLst/>
+            </a:prstGeom>
+            <a:solidFill>
+              <a:srgbClr val="3AAFA9"/>
+            </a:solidFill>
+            <a:ln>
+              <a:solidFill>
+                <a:schemeClr val="tx1">
+                  <a:lumMod val="95000"/>
+                  <a:lumOff val="5000"/>
+                </a:schemeClr>
+              </a:solidFill>
+            </a:ln>
+          </p:spPr>
+          <p:style>
+            <a:lnRef idx="2">
+              <a:schemeClr val="accent1">
+                <a:shade val="50000"/>
+              </a:schemeClr>
+            </a:lnRef>
+            <a:fillRef idx="1">
+              <a:schemeClr val="accent1"/>
+            </a:fillRef>
+            <a:effectRef idx="0">
+              <a:schemeClr val="accent1"/>
+            </a:effectRef>
+            <a:fontRef idx="minor">
+              <a:schemeClr val="lt1"/>
+            </a:fontRef>
+          </p:style>
+          <p:txBody>
+            <a:bodyPr rtlCol="0" anchor="ctr"/>
+            <a:lstStyle/>
+            <a:p>
+              <a:pPr algn="ctr"/>
+              <a:endParaRPr lang="en-GB"/>
+            </a:p>
+          </p:txBody>
+        </p:sp>
+        <p:sp>
+          <p:nvSpPr>
+            <p:cNvPr id="20" name="BlokTextu 19">
+              <a:extLst>
+                <a:ext uri="{FF2B5EF4-FFF2-40B4-BE49-F238E27FC236}">
+                  <a16:creationId xmlns:a16="http://schemas.microsoft.com/office/drawing/2014/main" id="{0476CA55-9A5B-4BBF-A545-211248925810}"/>
+                </a:ext>
+              </a:extLst>
+            </p:cNvPr>
+            <p:cNvSpPr txBox="1"/>
+            <p:nvPr/>
+          </p:nvSpPr>
+          <p:spPr>
+            <a:xfrm>
+              <a:off x="2941770" y="2884775"/>
+              <a:ext cx="5186240" cy="2554545"/>
+            </a:xfrm>
+            <a:prstGeom prst="rect">
+              <a:avLst/>
+            </a:prstGeom>
+            <a:noFill/>
+          </p:spPr>
+          <p:txBody>
+            <a:bodyPr wrap="square" rtlCol="0">
+              <a:spAutoFit/>
+            </a:bodyPr>
+            <a:lstStyle/>
+            <a:p>
+              <a:endParaRPr lang="en-US" sz="2000" dirty="0"/>
+            </a:p>
+            <a:p>
+              <a:pPr marL="457200" indent="-457200">
+                <a:buAutoNum type="alphaLcParenR"/>
+              </a:pPr>
+              <a:r>
+                <a:rPr lang="en-US" sz="2000" dirty="0"/>
+                <a:t>Star Wars Episode III – Revenge of the Sith</a:t>
+              </a:r>
+            </a:p>
+            <a:p>
+              <a:pPr marL="457200" indent="-457200">
+                <a:buAutoNum type="alphaLcParenR"/>
+              </a:pPr>
+              <a:endParaRPr lang="en-US" sz="2000" dirty="0"/>
+            </a:p>
+            <a:p>
+              <a:pPr marL="457200" indent="-457200">
+                <a:buAutoNum type="alphaLcParenR"/>
+              </a:pPr>
+              <a:r>
+                <a:rPr lang="en-US" sz="2000" dirty="0"/>
+                <a:t>The Truman Show</a:t>
+              </a:r>
+            </a:p>
+            <a:p>
+              <a:pPr marL="457200" indent="-457200">
+                <a:buAutoNum type="alphaLcParenR"/>
+              </a:pPr>
+              <a:endParaRPr lang="en-US" sz="2000" dirty="0"/>
+            </a:p>
+            <a:p>
+              <a:pPr marL="457200" indent="-457200">
+                <a:buAutoNum type="alphaLcParenR"/>
+              </a:pPr>
+              <a:r>
+                <a:rPr lang="en-US" sz="2000" dirty="0"/>
+                <a:t>The Godfather</a:t>
+              </a:r>
+            </a:p>
+            <a:p>
+              <a:pPr marL="457200" indent="-457200">
+                <a:buAutoNum type="alphaLcParenR"/>
+              </a:pPr>
+              <a:endParaRPr lang="en-US" sz="2000" dirty="0"/>
+            </a:p>
+            <a:p>
+              <a:pPr marL="457200" indent="-457200">
+                <a:buAutoNum type="alphaLcParenR"/>
+              </a:pPr>
+              <a:r>
+                <a:rPr lang="en-US" sz="2000" dirty="0"/>
+                <a:t>The Irishman</a:t>
+              </a:r>
+              <a:endParaRPr lang="en-GB" sz="2000" dirty="0"/>
+            </a:p>
+          </p:txBody>
+        </p:sp>
+      </p:grpSp>
+      <p:sp>
+        <p:nvSpPr>
+          <p:cNvPr id="21" name="Nadpis 1">
+            <a:extLst>
+              <a:ext uri="{FF2B5EF4-FFF2-40B4-BE49-F238E27FC236}">
+                <a16:creationId xmlns:a16="http://schemas.microsoft.com/office/drawing/2014/main" id="{C0090D4C-5FDA-4C6C-AAFA-CCB1ACE6EAD5}"/>
+              </a:ext>
+            </a:extLst>
+          </p:cNvPr>
+          <p:cNvSpPr txBox="1">
+            <a:spLocks/>
+          </p:cNvSpPr>
+          <p:nvPr/>
+        </p:nvSpPr>
+        <p:spPr>
+          <a:xfrm>
+            <a:off x="-72303" y="6213765"/>
+            <a:ext cx="12296774" cy="644235"/>
+          </a:xfrm>
+          <a:prstGeom prst="rect">
+            <a:avLst/>
+          </a:prstGeom>
+          <a:solidFill>
+            <a:schemeClr val="bg1">
+              <a:lumMod val="65000"/>
+            </a:schemeClr>
+          </a:solidFill>
+        </p:spPr>
+        <p:txBody>
+          <a:bodyPr vert="horz" lIns="91440" tIns="45720" rIns="91440" bIns="45720" rtlCol="0" anchor="b">
+            <a:normAutofit fontScale="77500" lnSpcReduction="20000"/>
+          </a:bodyPr>
+          <a:lstStyle>
+            <a:lvl1pPr algn="ctr" defTabSz="914400" rtl="0" eaLnBrk="1" latinLnBrk="0" hangingPunct="1">
+              <a:lnSpc>
+                <a:spcPct val="90000"/>
+              </a:lnSpc>
+              <a:spcBef>
+                <a:spcPct val="0"/>
+              </a:spcBef>
+              <a:buNone/>
+              <a:defRPr sz="6000" kern="1200">
+                <a:solidFill>
+                  <a:schemeClr val="tx1"/>
+                </a:solidFill>
+                <a:latin typeface="+mj-lt"/>
+                <a:ea typeface="+mj-ea"/>
+                <a:cs typeface="+mj-cs"/>
+              </a:defRPr>
+            </a:lvl1pPr>
+          </a:lstStyle>
+          <a:p>
+            <a:endParaRPr lang="en-GB" dirty="0">
+              <a:solidFill>
+                <a:schemeClr val="bg1"/>
+              </a:solidFill>
+              <a:latin typeface="Script MT Bold" panose="03040602040607080904" pitchFamily="66" charset="0"/>
+              <a:cs typeface="Aharoni" panose="02010803020104030203" pitchFamily="2" charset="-79"/>
+            </a:endParaRPr>
+          </a:p>
+        </p:txBody>
+      </p:sp>
+      <p:grpSp>
+        <p:nvGrpSpPr>
+          <p:cNvPr id="27" name="Skupina 26">
+            <a:extLst>
+              <a:ext uri="{FF2B5EF4-FFF2-40B4-BE49-F238E27FC236}">
+                <a16:creationId xmlns:a16="http://schemas.microsoft.com/office/drawing/2014/main" id="{275ECF91-871A-40D1-AF91-419A1F6FD655}"/>
+              </a:ext>
+            </a:extLst>
+          </p:cNvPr>
+          <p:cNvGrpSpPr/>
+          <p:nvPr/>
+        </p:nvGrpSpPr>
+        <p:grpSpPr>
+          <a:xfrm>
+            <a:off x="5231532" y="6337433"/>
+            <a:ext cx="1728937" cy="396898"/>
+            <a:chOff x="5137016" y="6337433"/>
+            <a:chExt cx="1728937" cy="396898"/>
+          </a:xfrm>
+        </p:grpSpPr>
+        <p:pic>
+          <p:nvPicPr>
+            <p:cNvPr id="22" name="Obrázok 21">
+              <a:extLst>
+                <a:ext uri="{FF2B5EF4-FFF2-40B4-BE49-F238E27FC236}">
+                  <a16:creationId xmlns:a16="http://schemas.microsoft.com/office/drawing/2014/main" id="{0D7AF0E5-CF3D-4BF5-BFDB-95D215032B08}"/>
+                </a:ext>
+              </a:extLst>
+            </p:cNvPr>
+            <p:cNvPicPr>
+              <a:picLocks noChangeAspect="1"/>
+            </p:cNvPicPr>
+            <p:nvPr/>
+          </p:nvPicPr>
+          <p:blipFill>
+            <a:blip r:embed="rId5">
+              <a:extLst>
+                <a:ext uri="{28A0092B-C50C-407E-A947-70E740481C1C}">
+                  <a14:useLocalDpi xmlns:a14="http://schemas.microsoft.com/office/drawing/2010/main" val="0"/>
+                </a:ext>
+              </a:extLst>
+            </a:blip>
+            <a:stretch>
+              <a:fillRect/>
+            </a:stretch>
+          </p:blipFill>
+          <p:spPr>
+            <a:xfrm>
+              <a:off x="5137016" y="6337433"/>
+              <a:ext cx="396898" cy="396898"/>
+            </a:xfrm>
+            <a:prstGeom prst="rect">
+              <a:avLst/>
+            </a:prstGeom>
+          </p:spPr>
+        </p:pic>
+        <p:pic>
+          <p:nvPicPr>
+            <p:cNvPr id="24" name="Obrázok 23">
+              <a:extLst>
+                <a:ext uri="{FF2B5EF4-FFF2-40B4-BE49-F238E27FC236}">
+                  <a16:creationId xmlns:a16="http://schemas.microsoft.com/office/drawing/2014/main" id="{BE948C58-8A42-40BE-8E8D-C09D2DFE1801}"/>
+                </a:ext>
+              </a:extLst>
+            </p:cNvPr>
+            <p:cNvPicPr>
+              <a:picLocks noChangeAspect="1"/>
+            </p:cNvPicPr>
+            <p:nvPr/>
+          </p:nvPicPr>
+          <p:blipFill>
+            <a:blip r:embed="rId6">
+              <a:extLst>
+                <a:ext uri="{28A0092B-C50C-407E-A947-70E740481C1C}">
+                  <a14:useLocalDpi xmlns:a14="http://schemas.microsoft.com/office/drawing/2010/main" val="0"/>
+                </a:ext>
+              </a:extLst>
+            </a:blip>
+            <a:stretch>
+              <a:fillRect/>
+            </a:stretch>
+          </p:blipFill>
+          <p:spPr>
+            <a:xfrm>
+              <a:off x="6469055" y="6337433"/>
+              <a:ext cx="396898" cy="396898"/>
+            </a:xfrm>
+            <a:prstGeom prst="rect">
+              <a:avLst/>
+            </a:prstGeom>
+          </p:spPr>
+        </p:pic>
+        <p:pic>
+          <p:nvPicPr>
+            <p:cNvPr id="26" name="Obrázok 25">
+              <a:extLst>
+                <a:ext uri="{FF2B5EF4-FFF2-40B4-BE49-F238E27FC236}">
+                  <a16:creationId xmlns:a16="http://schemas.microsoft.com/office/drawing/2014/main" id="{6590A147-A8C7-4E3A-A4CB-F1134546E98B}"/>
+                </a:ext>
+              </a:extLst>
+            </p:cNvPr>
+            <p:cNvPicPr>
+              <a:picLocks noChangeAspect="1"/>
+            </p:cNvPicPr>
+            <p:nvPr/>
+          </p:nvPicPr>
+          <p:blipFill>
+            <a:blip r:embed="rId7">
+              <a:extLst>
+                <a:ext uri="{28A0092B-C50C-407E-A947-70E740481C1C}">
+                  <a14:useLocalDpi xmlns:a14="http://schemas.microsoft.com/office/drawing/2010/main" val="0"/>
+                </a:ext>
+              </a:extLst>
+            </a:blip>
+            <a:stretch>
+              <a:fillRect/>
+            </a:stretch>
+          </p:blipFill>
+          <p:spPr>
+            <a:xfrm>
+              <a:off x="5795376" y="6337433"/>
+              <a:ext cx="396898" cy="396898"/>
+            </a:xfrm>
+            <a:prstGeom prst="rect">
+              <a:avLst/>
+            </a:prstGeom>
+          </p:spPr>
+        </p:pic>
+      </p:grpSp>
+      <p:sp>
+        <p:nvSpPr>
+          <p:cNvPr id="23" name="Nadpis 1">
+            <a:extLst>
+              <a:ext uri="{FF2B5EF4-FFF2-40B4-BE49-F238E27FC236}">
+                <a16:creationId xmlns:a16="http://schemas.microsoft.com/office/drawing/2014/main" id="{0DF8250D-66F5-48C2-B1E4-F4E4F1C4E04D}"/>
+              </a:ext>
+            </a:extLst>
+          </p:cNvPr>
+          <p:cNvSpPr txBox="1">
+            <a:spLocks/>
+          </p:cNvSpPr>
+          <p:nvPr/>
+        </p:nvSpPr>
+        <p:spPr>
+          <a:xfrm flipV="1">
+            <a:off x="8870623" y="928950"/>
+            <a:ext cx="3321377" cy="2950843"/>
+          </a:xfrm>
+          <a:prstGeom prst="rect">
+            <a:avLst/>
+          </a:prstGeom>
+          <a:solidFill>
+            <a:schemeClr val="bg1">
+              <a:lumMod val="65000"/>
+            </a:schemeClr>
+          </a:solidFill>
+        </p:spPr>
+        <p:txBody>
+          <a:bodyPr vert="horz" lIns="91440" tIns="45720" rIns="91440" bIns="45720" rtlCol="0" anchor="b">
+            <a:normAutofit/>
+          </a:bodyPr>
+          <a:lstStyle>
+            <a:lvl1pPr algn="ctr" defTabSz="914400" rtl="0" eaLnBrk="1" latinLnBrk="0" hangingPunct="1">
+              <a:lnSpc>
+                <a:spcPct val="90000"/>
+              </a:lnSpc>
+              <a:spcBef>
+                <a:spcPct val="0"/>
+              </a:spcBef>
+              <a:buNone/>
+              <a:defRPr sz="6000" kern="1200">
+                <a:solidFill>
+                  <a:schemeClr val="tx1"/>
+                </a:solidFill>
+                <a:latin typeface="+mj-lt"/>
+                <a:ea typeface="+mj-ea"/>
+                <a:cs typeface="+mj-cs"/>
+              </a:defRPr>
+            </a:lvl1pPr>
+          </a:lstStyle>
+          <a:p>
+            <a:endParaRPr lang="en-GB" dirty="0">
+              <a:solidFill>
+                <a:schemeClr val="bg1"/>
+              </a:solidFill>
+              <a:latin typeface="Script MT Bold" panose="03040602040607080904" pitchFamily="66" charset="0"/>
+              <a:cs typeface="Aharoni" panose="02010803020104030203" pitchFamily="2" charset="-79"/>
+            </a:endParaRPr>
+          </a:p>
+        </p:txBody>
+      </p:sp>
+      <p:sp>
+        <p:nvSpPr>
+          <p:cNvPr id="28" name="Nadpis 1">
+            <a:extLst>
+              <a:ext uri="{FF2B5EF4-FFF2-40B4-BE49-F238E27FC236}">
+                <a16:creationId xmlns:a16="http://schemas.microsoft.com/office/drawing/2014/main" id="{AD4DB25F-7BA9-4D39-924A-047C2D829D8E}"/>
+              </a:ext>
+            </a:extLst>
+          </p:cNvPr>
+          <p:cNvSpPr txBox="1">
+            <a:spLocks/>
+          </p:cNvSpPr>
+          <p:nvPr/>
+        </p:nvSpPr>
+        <p:spPr>
+          <a:xfrm flipV="1">
+            <a:off x="8903094" y="1800149"/>
+            <a:ext cx="3321377" cy="630681"/>
+          </a:xfrm>
+          <a:prstGeom prst="rect">
+            <a:avLst/>
+          </a:prstGeom>
+          <a:solidFill>
+            <a:schemeClr val="tx1">
+              <a:lumMod val="50000"/>
+              <a:lumOff val="50000"/>
+            </a:schemeClr>
+          </a:solidFill>
+        </p:spPr>
+        <p:txBody>
+          <a:bodyPr vert="horz" lIns="91440" tIns="45720" rIns="91440" bIns="45720" rtlCol="0" anchor="b">
+            <a:normAutofit fontScale="77500" lnSpcReduction="20000"/>
+          </a:bodyPr>
+          <a:lstStyle>
+            <a:lvl1pPr algn="ctr" defTabSz="914400" rtl="0" eaLnBrk="1" latinLnBrk="0" hangingPunct="1">
+              <a:lnSpc>
+                <a:spcPct val="90000"/>
+              </a:lnSpc>
+              <a:spcBef>
+                <a:spcPct val="0"/>
+              </a:spcBef>
+              <a:buNone/>
+              <a:defRPr sz="6000" kern="1200">
+                <a:solidFill>
+                  <a:schemeClr val="tx1"/>
+                </a:solidFill>
+                <a:latin typeface="+mj-lt"/>
+                <a:ea typeface="+mj-ea"/>
+                <a:cs typeface="+mj-cs"/>
+              </a:defRPr>
+            </a:lvl1pPr>
+          </a:lstStyle>
+          <a:p>
+            <a:endParaRPr lang="en-GB" dirty="0">
+              <a:solidFill>
+                <a:schemeClr val="bg1"/>
+              </a:solidFill>
+              <a:latin typeface="Script MT Bold" panose="03040602040607080904" pitchFamily="66" charset="0"/>
+              <a:cs typeface="Aharoni" panose="02010803020104030203" pitchFamily="2" charset="-79"/>
+            </a:endParaRPr>
+          </a:p>
+        </p:txBody>
+      </p:sp>
+      <p:sp>
+        <p:nvSpPr>
+          <p:cNvPr id="25" name="BlokTextu 24">
+            <a:extLst>
+              <a:ext uri="{FF2B5EF4-FFF2-40B4-BE49-F238E27FC236}">
+                <a16:creationId xmlns:a16="http://schemas.microsoft.com/office/drawing/2014/main" id="{651A769B-20C5-489A-88DC-76C3AE0B556F}"/>
+              </a:ext>
+            </a:extLst>
+          </p:cNvPr>
+          <p:cNvSpPr txBox="1"/>
+          <p:nvPr/>
+        </p:nvSpPr>
+        <p:spPr>
+          <a:xfrm>
+            <a:off x="9043554" y="1085560"/>
+            <a:ext cx="3003902" cy="2468368"/>
+          </a:xfrm>
+          <a:prstGeom prst="rect">
+            <a:avLst/>
+          </a:prstGeom>
+          <a:noFill/>
+        </p:spPr>
+        <p:txBody>
+          <a:bodyPr wrap="square" rtlCol="0">
+            <a:spAutoFit/>
+          </a:bodyPr>
+          <a:lstStyle/>
+          <a:p>
+            <a:pPr algn="ctr">
+              <a:lnSpc>
+                <a:spcPct val="200000"/>
+              </a:lnSpc>
+            </a:pPr>
+            <a:r>
+              <a:rPr lang="en-US" sz="2000" b="1" dirty="0">
+                <a:latin typeface="+mj-lt"/>
+              </a:rPr>
+              <a:t>Leaderboard</a:t>
+            </a:r>
+          </a:p>
+          <a:p>
+            <a:pPr algn="ctr">
+              <a:lnSpc>
+                <a:spcPct val="200000"/>
+              </a:lnSpc>
+            </a:pPr>
+            <a:r>
+              <a:rPr lang="en-US" sz="2000" b="1" dirty="0">
+                <a:latin typeface="+mj-lt"/>
+              </a:rPr>
+              <a:t>Blog</a:t>
+            </a:r>
+          </a:p>
+          <a:p>
+            <a:pPr algn="ctr">
+              <a:lnSpc>
+                <a:spcPct val="200000"/>
+              </a:lnSpc>
+            </a:pPr>
+            <a:r>
+              <a:rPr lang="en-US" sz="2000" b="1" dirty="0">
+                <a:latin typeface="+mj-lt"/>
+              </a:rPr>
+              <a:t>Contact</a:t>
+            </a:r>
+          </a:p>
+          <a:p>
+            <a:pPr algn="ctr">
+              <a:lnSpc>
+                <a:spcPct val="200000"/>
+              </a:lnSpc>
+            </a:pPr>
+            <a:r>
+              <a:rPr lang="en-US" sz="2000" b="1" dirty="0">
+                <a:latin typeface="+mj-lt"/>
+              </a:rPr>
+              <a:t>About me</a:t>
+            </a:r>
+          </a:p>
+        </p:txBody>
+      </p:sp>
+    </p:spTree>
+    <p:extLst>
+      <p:ext uri="{BB962C8B-B14F-4D97-AF65-F5344CB8AC3E}">
+        <p14:creationId xmlns:p14="http://schemas.microsoft.com/office/powerpoint/2010/main" val="3401295423"/>
+      </p:ext>
+    </p:extLst>
+  </p:cSld>
+  <p:clrMapOvr>
+    <a:masterClrMapping/>
+  </p:clrMapOvr>
+</p:sld>
+</file>
+
+<file path=ppt/slides/slide3.xml><?xml version="1.0" encoding="utf-8"?>
+<p:sld xmlns:a="http://schemas.openxmlformats.org/drawingml/2006/main" xmlns:r="http://schemas.openxmlformats.org/officeDocument/2006/relationships" xmlns:p="http://schemas.openxmlformats.org/presentationml/2006/main">
+  <p:cSld>
     <p:spTree>
       <p:nvGrpSpPr>
         <p:cNvPr id="1" name=""/>

</xml_diff>